<commit_message>
Updated Lesson1 and presentation
</commit_message>
<xml_diff>
--- a/Workshop_1/Presentation/Azureskolen-Workshop#1.pptx
+++ b/Workshop_1/Presentation/Azureskolen-Workshop#1.pptx
@@ -7,10 +7,10 @@
     <p:sldMasterId id="2147483705" r:id="rId6"/>
   </p:sldMasterIdLst>
   <p:notesMasterIdLst>
-    <p:notesMasterId r:id="rId34"/>
+    <p:notesMasterId r:id="rId35"/>
   </p:notesMasterIdLst>
   <p:handoutMasterIdLst>
-    <p:handoutMasterId r:id="rId35"/>
+    <p:handoutMasterId r:id="rId36"/>
   </p:handoutMasterIdLst>
   <p:sldIdLst>
     <p:sldId id="256" r:id="rId7"/>
@@ -31,15 +31,16 @@
     <p:sldId id="271" r:id="rId22"/>
     <p:sldId id="272" r:id="rId23"/>
     <p:sldId id="283" r:id="rId24"/>
-    <p:sldId id="278" r:id="rId25"/>
-    <p:sldId id="273" r:id="rId26"/>
-    <p:sldId id="277" r:id="rId27"/>
-    <p:sldId id="279" r:id="rId28"/>
-    <p:sldId id="270" r:id="rId29"/>
-    <p:sldId id="268" r:id="rId30"/>
-    <p:sldId id="281" r:id="rId31"/>
-    <p:sldId id="282" r:id="rId32"/>
-    <p:sldId id="284" r:id="rId33"/>
+    <p:sldId id="285" r:id="rId25"/>
+    <p:sldId id="278" r:id="rId26"/>
+    <p:sldId id="273" r:id="rId27"/>
+    <p:sldId id="277" r:id="rId28"/>
+    <p:sldId id="279" r:id="rId29"/>
+    <p:sldId id="270" r:id="rId30"/>
+    <p:sldId id="268" r:id="rId31"/>
+    <p:sldId id="281" r:id="rId32"/>
+    <p:sldId id="282" r:id="rId33"/>
+    <p:sldId id="284" r:id="rId34"/>
   </p:sldIdLst>
   <p:sldSz cx="12192000" cy="6858000"/>
   <p:notesSz cx="6858000" cy="9144000"/>
@@ -1130,7 +1131,7 @@
           <a:p>
             <a:fld id="{180377DB-C4B0-49B2-8838-0F01BA83B7C4}" type="slidenum">
               <a:rPr lang="nb-NO" smtClean="0"/>
-              <a:t>19</a:t>
+              <a:t>20</a:t>
             </a:fld>
             <a:endParaRPr lang="nb-NO"/>
           </a:p>
@@ -1193,113 +1194,7 @@
           <a:bodyPr/>
           <a:lstStyle/>
           <a:p>
-            <a:r>
-              <a:rPr lang="nb-NO" dirty="0"/>
-              <a:t>Fullt mulig å installere</a:t>
-            </a:r>
-          </a:p>
-          <a:p>
-            <a:r>
-              <a:rPr lang="nb-NO" dirty="0"/>
-              <a:t>Azure SQL Database</a:t>
-            </a:r>
-          </a:p>
-          <a:p>
-            <a:pPr marL="171450" indent="-171450">
-              <a:buFontTx/>
-              <a:buChar char="-"/>
-            </a:pPr>
-            <a:r>
-              <a:rPr lang="nb-NO" dirty="0"/>
-              <a:t>Tjeneste: Alt inkludert  </a:t>
-            </a:r>
-          </a:p>
-          <a:p>
-            <a:pPr marL="171450" indent="-171450">
-              <a:buFontTx/>
-              <a:buChar char="-"/>
-            </a:pPr>
-            <a:r>
-              <a:rPr lang="nb-NO" dirty="0"/>
-              <a:t>Ytelse måles i DTU (Data Transfer Units)</a:t>
-            </a:r>
-          </a:p>
-          <a:p>
-            <a:pPr marL="171450" indent="-171450">
-              <a:buFontTx/>
-              <a:buChar char="-"/>
-            </a:pPr>
-            <a:r>
-              <a:rPr lang="nb-NO" dirty="0"/>
-              <a:t>Mangler noen </a:t>
-            </a:r>
-            <a:r>
-              <a:rPr lang="nb-NO" dirty="0" err="1"/>
-              <a:t>features</a:t>
-            </a:r>
-            <a:r>
-              <a:rPr lang="nb-NO" dirty="0"/>
-              <a:t> fra vanlig.</a:t>
-            </a:r>
-          </a:p>
-          <a:p>
-            <a:pPr marL="171450" indent="-171450">
-              <a:buFontTx/>
-              <a:buChar char="-"/>
-            </a:pPr>
-            <a:r>
-              <a:rPr lang="nb-NO" dirty="0"/>
-              <a:t>Man kan også kjøre opp en vm og </a:t>
-            </a:r>
-            <a:r>
-              <a:rPr lang="nb-NO" dirty="0" err="1"/>
-              <a:t>instllaere</a:t>
-            </a:r>
-            <a:r>
-              <a:rPr lang="nb-NO" dirty="0"/>
-              <a:t> </a:t>
-            </a:r>
-            <a:r>
-              <a:rPr lang="nb-NO" dirty="0" err="1"/>
-              <a:t>sql</a:t>
-            </a:r>
-            <a:r>
-              <a:rPr lang="nb-NO" dirty="0"/>
-              <a:t> server. Men da må man ha egen lisens, og man må.</a:t>
-            </a:r>
-          </a:p>
-          <a:p>
-            <a:pPr marL="171450" indent="-171450">
-              <a:buFontTx/>
-              <a:buChar char="-"/>
-            </a:pPr>
             <a:endParaRPr lang="nb-NO" dirty="0"/>
-          </a:p>
-          <a:p>
-            <a:r>
-              <a:rPr lang="nb-NO" dirty="0"/>
-              <a:t>Cosmos DB:</a:t>
-            </a:r>
-          </a:p>
-          <a:p>
-            <a:pPr marL="171450" indent="-171450">
-              <a:buFontTx/>
-              <a:buChar char="-"/>
-            </a:pPr>
-            <a:r>
-              <a:rPr lang="nb-NO" dirty="0"/>
-              <a:t>Mult</a:t>
-            </a:r>
-          </a:p>
-          <a:p>
-            <a:pPr marL="0" indent="0">
-              <a:buFontTx/>
-              <a:buNone/>
-            </a:pPr>
-            <a:r>
-              <a:rPr lang="nb-NO" dirty="0"/>
-              <a:t>- Satses mye på av </a:t>
-            </a:r>
           </a:p>
         </p:txBody>
       </p:sp>
@@ -1320,7 +1215,7 @@
           <a:p>
             <a:fld id="{180377DB-C4B0-49B2-8838-0F01BA83B7C4}" type="slidenum">
               <a:rPr lang="nb-NO" smtClean="0"/>
-              <a:t>23</a:t>
+              <a:t>22</a:t>
             </a:fld>
             <a:endParaRPr lang="nb-NO"/>
           </a:p>
@@ -1329,7 +1224,7 @@
     </p:spTree>
     <p:extLst>
       <p:ext uri="{BB962C8B-B14F-4D97-AF65-F5344CB8AC3E}">
-        <p14:creationId xmlns:p14="http://schemas.microsoft.com/office/powerpoint/2010/main" val="2766437490"/>
+        <p14:creationId xmlns:p14="http://schemas.microsoft.com/office/powerpoint/2010/main" val="546288370"/>
       </p:ext>
     </p:extLst>
   </p:cSld>
@@ -1384,12 +1279,111 @@
           <a:lstStyle/>
           <a:p>
             <a:r>
+              <a:rPr lang="nb-NO" dirty="0"/>
+              <a:t>Fullt mulig å installere</a:t>
+            </a:r>
+          </a:p>
+          <a:p>
+            <a:r>
+              <a:rPr lang="nb-NO" dirty="0"/>
+              <a:t>Azure SQL Database</a:t>
+            </a:r>
+          </a:p>
+          <a:p>
+            <a:pPr marL="171450" indent="-171450">
+              <a:buFontTx/>
+              <a:buChar char="-"/>
+            </a:pPr>
+            <a:r>
+              <a:rPr lang="nb-NO" dirty="0"/>
+              <a:t>Tjeneste: Alt inkludert  </a:t>
+            </a:r>
+          </a:p>
+          <a:p>
+            <a:pPr marL="171450" indent="-171450">
+              <a:buFontTx/>
+              <a:buChar char="-"/>
+            </a:pPr>
+            <a:r>
+              <a:rPr lang="nb-NO" dirty="0"/>
+              <a:t>Ytelse måles i DTU (Data Transfer Units)</a:t>
+            </a:r>
+          </a:p>
+          <a:p>
+            <a:pPr marL="171450" indent="-171450">
+              <a:buFontTx/>
+              <a:buChar char="-"/>
+            </a:pPr>
+            <a:r>
+              <a:rPr lang="nb-NO" dirty="0"/>
+              <a:t>Mangler noen </a:t>
+            </a:r>
+            <a:r>
               <a:rPr lang="nb-NO" dirty="0" err="1"/>
-              <a:t>Blobs</a:t>
-            </a:r>
-            <a:r>
-              <a:rPr lang="nb-NO" dirty="0"/>
-              <a:t>- virtuell katalogstruktur</a:t>
+              <a:t>features</a:t>
+            </a:r>
+            <a:r>
+              <a:rPr lang="nb-NO" dirty="0"/>
+              <a:t> fra vanlig.</a:t>
+            </a:r>
+          </a:p>
+          <a:p>
+            <a:pPr marL="171450" indent="-171450">
+              <a:buFontTx/>
+              <a:buChar char="-"/>
+            </a:pPr>
+            <a:r>
+              <a:rPr lang="nb-NO" dirty="0"/>
+              <a:t>Man kan også kjøre opp en vm og </a:t>
+            </a:r>
+            <a:r>
+              <a:rPr lang="nb-NO" dirty="0" err="1"/>
+              <a:t>instllaere</a:t>
+            </a:r>
+            <a:r>
+              <a:rPr lang="nb-NO" dirty="0"/>
+              <a:t> </a:t>
+            </a:r>
+            <a:r>
+              <a:rPr lang="nb-NO" dirty="0" err="1"/>
+              <a:t>sql</a:t>
+            </a:r>
+            <a:r>
+              <a:rPr lang="nb-NO" dirty="0"/>
+              <a:t> server. Men da må man ha egen lisens, og man må.</a:t>
+            </a:r>
+          </a:p>
+          <a:p>
+            <a:pPr marL="171450" indent="-171450">
+              <a:buFontTx/>
+              <a:buChar char="-"/>
+            </a:pPr>
+            <a:endParaRPr lang="nb-NO" dirty="0"/>
+          </a:p>
+          <a:p>
+            <a:r>
+              <a:rPr lang="nb-NO" dirty="0"/>
+              <a:t>Cosmos DB:</a:t>
+            </a:r>
+          </a:p>
+          <a:p>
+            <a:pPr marL="171450" indent="-171450">
+              <a:buFontTx/>
+              <a:buChar char="-"/>
+            </a:pPr>
+            <a:r>
+              <a:rPr lang="nb-NO" dirty="0"/>
+              <a:t>Mult</a:t>
+            </a:r>
+          </a:p>
+          <a:p>
+            <a:pPr marL="0" indent="0">
+              <a:buFontTx/>
+              <a:buNone/>
+            </a:pPr>
+            <a:r>
+              <a:rPr lang="nb-NO" dirty="0"/>
+              <a:t>- Satses mye på av </a:t>
             </a:r>
           </a:p>
         </p:txBody>
@@ -1420,7 +1414,7 @@
     </p:spTree>
     <p:extLst>
       <p:ext uri="{BB962C8B-B14F-4D97-AF65-F5344CB8AC3E}">
-        <p14:creationId xmlns:p14="http://schemas.microsoft.com/office/powerpoint/2010/main" val="2113116676"/>
+        <p14:creationId xmlns:p14="http://schemas.microsoft.com/office/powerpoint/2010/main" val="2766437490"/>
       </p:ext>
     </p:extLst>
   </p:cSld>
@@ -1475,24 +1469,12 @@
           <a:lstStyle/>
           <a:p>
             <a:r>
-              <a:rPr lang="nb-NO" dirty="0"/>
-              <a:t>SAS-tokens: Key-</a:t>
-            </a:r>
-            <a:r>
               <a:rPr lang="nb-NO" dirty="0" err="1"/>
-              <a:t>Valet</a:t>
-            </a:r>
-            <a:r>
-              <a:rPr lang="nb-NO" dirty="0"/>
-              <a:t> </a:t>
-            </a:r>
-            <a:r>
-              <a:rPr lang="nb-NO" dirty="0" err="1"/>
-              <a:t>pattern</a:t>
-            </a:r>
-            <a:r>
-              <a:rPr lang="nb-NO" dirty="0"/>
-              <a:t>.</a:t>
+              <a:t>Blobs</a:t>
+            </a:r>
+            <a:r>
+              <a:rPr lang="nb-NO" dirty="0"/>
+              <a:t>- virtuell katalogstruktur</a:t>
             </a:r>
           </a:p>
         </p:txBody>
@@ -1523,7 +1505,7 @@
     </p:spTree>
     <p:extLst>
       <p:ext uri="{BB962C8B-B14F-4D97-AF65-F5344CB8AC3E}">
-        <p14:creationId xmlns:p14="http://schemas.microsoft.com/office/powerpoint/2010/main" val="2379882642"/>
+        <p14:creationId xmlns:p14="http://schemas.microsoft.com/office/powerpoint/2010/main" val="2113116676"/>
       </p:ext>
     </p:extLst>
   </p:cSld>
@@ -1579,14 +1561,24 @@
           <a:p>
             <a:r>
               <a:rPr lang="nb-NO" dirty="0"/>
-              <a:t>Eksempel: haveibeenpwd.com fra Troy Hunt blir brukt til dette:</a:t>
-            </a:r>
-          </a:p>
-          <a:p>
-            <a:endParaRPr lang="nb-NO" dirty="0"/>
-          </a:p>
-          <a:p>
-            <a:endParaRPr lang="nb-NO" dirty="0"/>
+              <a:t>SAS-tokens: Key-</a:t>
+            </a:r>
+            <a:r>
+              <a:rPr lang="nb-NO" dirty="0" err="1"/>
+              <a:t>Valet</a:t>
+            </a:r>
+            <a:r>
+              <a:rPr lang="nb-NO" dirty="0"/>
+              <a:t> </a:t>
+            </a:r>
+            <a:r>
+              <a:rPr lang="nb-NO" dirty="0" err="1"/>
+              <a:t>pattern</a:t>
+            </a:r>
+            <a:r>
+              <a:rPr lang="nb-NO" dirty="0"/>
+              <a:t>.</a:t>
+            </a:r>
           </a:p>
         </p:txBody>
       </p:sp>
@@ -1608,6 +1600,99 @@
             <a:fld id="{180377DB-C4B0-49B2-8838-0F01BA83B7C4}" type="slidenum">
               <a:rPr lang="nb-NO" smtClean="0"/>
               <a:t>26</a:t>
+            </a:fld>
+            <a:endParaRPr lang="nb-NO"/>
+          </a:p>
+        </p:txBody>
+      </p:sp>
+    </p:spTree>
+    <p:extLst>
+      <p:ext uri="{BB962C8B-B14F-4D97-AF65-F5344CB8AC3E}">
+        <p14:creationId xmlns:p14="http://schemas.microsoft.com/office/powerpoint/2010/main" val="2379882642"/>
+      </p:ext>
+    </p:extLst>
+  </p:cSld>
+  <p:clrMapOvr>
+    <a:masterClrMapping/>
+  </p:clrMapOvr>
+</p:notes>
+</file>
+
+<file path=ppt/notesSlides/notesSlide18.xml><?xml version="1.0" encoding="utf-8"?>
+<p:notes xmlns:a="http://schemas.openxmlformats.org/drawingml/2006/main" xmlns:r="http://schemas.openxmlformats.org/officeDocument/2006/relationships" xmlns:p="http://schemas.openxmlformats.org/presentationml/2006/main">
+  <p:cSld>
+    <p:spTree>
+      <p:nvGrpSpPr>
+        <p:cNvPr id="1" name=""/>
+        <p:cNvGrpSpPr/>
+        <p:nvPr/>
+      </p:nvGrpSpPr>
+      <p:grpSpPr>
+        <a:xfrm>
+          <a:off x="0" y="0"/>
+          <a:ext cx="0" cy="0"/>
+          <a:chOff x="0" y="0"/>
+          <a:chExt cx="0" cy="0"/>
+        </a:xfrm>
+      </p:grpSpPr>
+      <p:sp>
+        <p:nvSpPr>
+          <p:cNvPr id="2" name="Slide Image Placeholder 1"/>
+          <p:cNvSpPr>
+            <a:spLocks noGrp="1" noRot="1" noChangeAspect="1"/>
+          </p:cNvSpPr>
+          <p:nvPr>
+            <p:ph type="sldImg"/>
+          </p:nvPr>
+        </p:nvSpPr>
+        <p:spPr/>
+      </p:sp>
+      <p:sp>
+        <p:nvSpPr>
+          <p:cNvPr id="3" name="Notes Placeholder 2"/>
+          <p:cNvSpPr>
+            <a:spLocks noGrp="1"/>
+          </p:cNvSpPr>
+          <p:nvPr>
+            <p:ph type="body" idx="1"/>
+          </p:nvPr>
+        </p:nvSpPr>
+        <p:spPr/>
+        <p:txBody>
+          <a:bodyPr/>
+          <a:lstStyle/>
+          <a:p>
+            <a:r>
+              <a:rPr lang="nb-NO" dirty="0"/>
+              <a:t>Eksempel: haveibeenpwd.com fra Troy Hunt blir brukt til dette:</a:t>
+            </a:r>
+          </a:p>
+          <a:p>
+            <a:endParaRPr lang="nb-NO" dirty="0"/>
+          </a:p>
+          <a:p>
+            <a:endParaRPr lang="nb-NO" dirty="0"/>
+          </a:p>
+        </p:txBody>
+      </p:sp>
+      <p:sp>
+        <p:nvSpPr>
+          <p:cNvPr id="4" name="Slide Number Placeholder 3"/>
+          <p:cNvSpPr>
+            <a:spLocks noGrp="1"/>
+          </p:cNvSpPr>
+          <p:nvPr>
+            <p:ph type="sldNum" sz="quarter" idx="10"/>
+          </p:nvPr>
+        </p:nvSpPr>
+        <p:spPr/>
+        <p:txBody>
+          <a:bodyPr/>
+          <a:lstStyle/>
+          <a:p>
+            <a:fld id="{180377DB-C4B0-49B2-8838-0F01BA83B7C4}" type="slidenum">
+              <a:rPr lang="nb-NO" smtClean="0"/>
+              <a:t>27</a:t>
             </a:fld>
             <a:endParaRPr lang="nb-NO"/>
           </a:p>
@@ -12606,6 +12691,19 @@
               <a:t>En av de mest brukte tjenestene i Azure</a:t>
             </a:r>
           </a:p>
+          <a:p>
+            <a:r>
+              <a:rPr lang="nb-NO" dirty="0"/>
+              <a:t>Skalering</a:t>
+            </a:r>
+          </a:p>
+          <a:p>
+            <a:r>
+              <a:rPr lang="nb-NO" dirty="0" err="1"/>
+              <a:t>Autoskalering</a:t>
+            </a:r>
+            <a:endParaRPr lang="nb-NO" dirty="0"/>
+          </a:p>
         </p:txBody>
       </p:sp>
       <p:sp>
@@ -13671,14 +13769,14 @@
           </a:ln>
           <a:extLst>
             <a:ext uri="{909E8E84-426E-40dd-AFC4-6F175D3DCCD1}">
-              <a14:hiddenFill xmlns="" xmlns:a14="http://schemas.microsoft.com/office/drawing/2010/main" xmlns:lc="http://schemas.openxmlformats.org/drawingml/2006/lockedCanvas">
+              <a14:hiddenFill xmlns:lc="http://schemas.openxmlformats.org/drawingml/2006/lockedCanvas" xmlns:a14="http://schemas.microsoft.com/office/drawing/2010/main" xmlns="">
                 <a:solidFill>
                   <a:srgbClr val="FFFFFF"/>
                 </a:solidFill>
               </a14:hiddenFill>
             </a:ext>
             <a:ext uri="{91240B29-F687-4f45-9708-019B960494DF}">
-              <a14:hiddenLine xmlns="" xmlns:a14="http://schemas.microsoft.com/office/drawing/2010/main" xmlns:lc="http://schemas.openxmlformats.org/drawingml/2006/lockedCanvas" w="9525">
+              <a14:hiddenLine xmlns:lc="http://schemas.openxmlformats.org/drawingml/2006/lockedCanvas" xmlns:a14="http://schemas.microsoft.com/office/drawing/2010/main" xmlns="" w="9525">
                 <a:solidFill>
                   <a:srgbClr val="000000"/>
                 </a:solidFill>
@@ -13867,14 +13965,14 @@
           </a:ln>
           <a:extLst>
             <a:ext uri="{909E8E84-426E-40dd-AFC4-6F175D3DCCD1}">
-              <a14:hiddenFill xmlns="" xmlns:a14="http://schemas.microsoft.com/office/drawing/2010/main" xmlns:lc="http://schemas.openxmlformats.org/drawingml/2006/lockedCanvas">
+              <a14:hiddenFill xmlns:lc="http://schemas.openxmlformats.org/drawingml/2006/lockedCanvas" xmlns:a14="http://schemas.microsoft.com/office/drawing/2010/main" xmlns="">
                 <a:solidFill>
                   <a:srgbClr val="FFFFFF"/>
                 </a:solidFill>
               </a14:hiddenFill>
             </a:ext>
             <a:ext uri="{91240B29-F687-4f45-9708-019B960494DF}">
-              <a14:hiddenLine xmlns="" xmlns:a14="http://schemas.microsoft.com/office/drawing/2010/main" xmlns:lc="http://schemas.openxmlformats.org/drawingml/2006/lockedCanvas" w="9525">
+              <a14:hiddenLine xmlns:lc="http://schemas.openxmlformats.org/drawingml/2006/lockedCanvas" xmlns:a14="http://schemas.microsoft.com/office/drawing/2010/main" xmlns="" w="9525">
                 <a:solidFill>
                   <a:srgbClr val="000000"/>
                 </a:solidFill>
@@ -14335,14 +14433,14 @@
           </a:ln>
           <a:extLst>
             <a:ext uri="{909E8E84-426E-40dd-AFC4-6F175D3DCCD1}">
-              <a14:hiddenFill xmlns="" xmlns:a14="http://schemas.microsoft.com/office/drawing/2010/main" xmlns:lc="http://schemas.openxmlformats.org/drawingml/2006/lockedCanvas">
+              <a14:hiddenFill xmlns:lc="http://schemas.openxmlformats.org/drawingml/2006/lockedCanvas" xmlns:a14="http://schemas.microsoft.com/office/drawing/2010/main" xmlns="">
                 <a:solidFill>
                   <a:srgbClr val="FFFFFF"/>
                 </a:solidFill>
               </a14:hiddenFill>
             </a:ext>
             <a:ext uri="{91240B29-F687-4f45-9708-019B960494DF}">
-              <a14:hiddenLine xmlns="" xmlns:a14="http://schemas.microsoft.com/office/drawing/2010/main" xmlns:lc="http://schemas.openxmlformats.org/drawingml/2006/lockedCanvas" w="9525">
+              <a14:hiddenLine xmlns:lc="http://schemas.openxmlformats.org/drawingml/2006/lockedCanvas" xmlns:a14="http://schemas.microsoft.com/office/drawing/2010/main" xmlns="" w="9525">
                 <a:solidFill>
                   <a:srgbClr val="000000"/>
                 </a:solidFill>
@@ -15048,14 +15146,14 @@
           </a:ln>
           <a:extLst>
             <a:ext uri="{909E8E84-426E-40dd-AFC4-6F175D3DCCD1}">
-              <a14:hiddenFill xmlns="" xmlns:a14="http://schemas.microsoft.com/office/drawing/2010/main" xmlns:lc="http://schemas.openxmlformats.org/drawingml/2006/lockedCanvas">
+              <a14:hiddenFill xmlns:lc="http://schemas.openxmlformats.org/drawingml/2006/lockedCanvas" xmlns:a14="http://schemas.microsoft.com/office/drawing/2010/main" xmlns="">
                 <a:solidFill>
                   <a:srgbClr val="FFFFFF"/>
                 </a:solidFill>
               </a14:hiddenFill>
             </a:ext>
             <a:ext uri="{91240B29-F687-4f45-9708-019B960494DF}">
-              <a14:hiddenLine xmlns="" xmlns:a14="http://schemas.microsoft.com/office/drawing/2010/main" xmlns:lc="http://schemas.openxmlformats.org/drawingml/2006/lockedCanvas" w="9525">
+              <a14:hiddenLine xmlns:lc="http://schemas.openxmlformats.org/drawingml/2006/lockedCanvas" xmlns:a14="http://schemas.microsoft.com/office/drawing/2010/main" xmlns="" w="9525">
                 <a:solidFill>
                   <a:srgbClr val="000000"/>
                 </a:solidFill>
@@ -15108,14 +15206,14 @@
           </a:ln>
           <a:extLst>
             <a:ext uri="{909E8E84-426E-40dd-AFC4-6F175D3DCCD1}">
-              <a14:hiddenFill xmlns="" xmlns:a14="http://schemas.microsoft.com/office/drawing/2010/main" xmlns:lc="http://schemas.openxmlformats.org/drawingml/2006/lockedCanvas">
+              <a14:hiddenFill xmlns:lc="http://schemas.openxmlformats.org/drawingml/2006/lockedCanvas" xmlns:a14="http://schemas.microsoft.com/office/drawing/2010/main" xmlns="">
                 <a:solidFill>
                   <a:srgbClr val="FFFFFF"/>
                 </a:solidFill>
               </a14:hiddenFill>
             </a:ext>
             <a:ext uri="{91240B29-F687-4f45-9708-019B960494DF}">
-              <a14:hiddenLine xmlns="" xmlns:a14="http://schemas.microsoft.com/office/drawing/2010/main" xmlns:lc="http://schemas.openxmlformats.org/drawingml/2006/lockedCanvas" w="9525">
+              <a14:hiddenLine xmlns:lc="http://schemas.openxmlformats.org/drawingml/2006/lockedCanvas" xmlns:a14="http://schemas.microsoft.com/office/drawing/2010/main" xmlns="" w="9525">
                 <a:solidFill>
                   <a:srgbClr val="000000"/>
                 </a:solidFill>
@@ -15350,7 +15448,7 @@
           <p:cNvPr id="2" name="Content Placeholder 1">
             <a:extLst>
               <a:ext uri="{FF2B5EF4-FFF2-40B4-BE49-F238E27FC236}">
-                <a16:creationId xmlns:a16="http://schemas.microsoft.com/office/drawing/2014/main" id="{DDB7E498-3C4D-40F4-9886-096A6156A712}"/>
+                <a16:creationId xmlns:a16="http://schemas.microsoft.com/office/drawing/2014/main" id="{7AE43EF0-28B5-4B4C-B457-228A74A9F4E5}"/>
               </a:ext>
             </a:extLst>
           </p:cNvPr>
@@ -15366,6 +15464,51 @@
           <a:bodyPr/>
           <a:lstStyle/>
           <a:p>
+            <a:r>
+              <a:rPr lang="nb-NO" dirty="0"/>
+              <a:t>Støtte for flere programmeringsspråk </a:t>
+            </a:r>
+          </a:p>
+          <a:p>
+            <a:pPr lvl="1"/>
+            <a:r>
+              <a:rPr lang="nb-NO" dirty="0"/>
+              <a:t>.NET</a:t>
+            </a:r>
+          </a:p>
+          <a:p>
+            <a:pPr lvl="1"/>
+            <a:r>
+              <a:rPr lang="nb-NO" dirty="0"/>
+              <a:t>Python</a:t>
+            </a:r>
+          </a:p>
+          <a:p>
+            <a:pPr lvl="1"/>
+            <a:r>
+              <a:rPr lang="nb-NO" dirty="0"/>
+              <a:t>Node.JS</a:t>
+            </a:r>
+          </a:p>
+          <a:p>
+            <a:r>
+              <a:rPr lang="nb-NO" dirty="0" err="1"/>
+              <a:t>Features</a:t>
+            </a:r>
+            <a:r>
+              <a:rPr lang="nb-NO" dirty="0"/>
+              <a:t>:</a:t>
+            </a:r>
+          </a:p>
+          <a:p>
+            <a:pPr lvl="1"/>
+            <a:r>
+              <a:rPr lang="nb-NO" dirty="0" err="1"/>
+              <a:t>Slots</a:t>
+            </a:r>
+            <a:endParaRPr lang="nb-NO" dirty="0"/>
+          </a:p>
+          <a:p>
             <a:pPr lvl="1"/>
             <a:endParaRPr lang="nb-NO" dirty="0"/>
           </a:p>
@@ -15376,7 +15519,7 @@
           <p:cNvPr id="3" name="Title 2">
             <a:extLst>
               <a:ext uri="{FF2B5EF4-FFF2-40B4-BE49-F238E27FC236}">
-                <a16:creationId xmlns:a16="http://schemas.microsoft.com/office/drawing/2014/main" id="{FF17F895-AE5B-489F-851C-DF70FA11E094}"/>
+                <a16:creationId xmlns:a16="http://schemas.microsoft.com/office/drawing/2014/main" id="{70B9FBB2-5FB2-406C-A4E8-B7F106A2FD51}"/>
               </a:ext>
             </a:extLst>
           </p:cNvPr>
@@ -15393,20 +15536,21 @@
           <a:lstStyle/>
           <a:p>
             <a:r>
+              <a:rPr lang="nb-NO" dirty="0"/>
+              <a:t>Web </a:t>
+            </a:r>
+            <a:r>
               <a:rPr lang="nb-NO" dirty="0" err="1"/>
-              <a:t>App</a:t>
-            </a:r>
-            <a:r>
-              <a:rPr lang="nb-NO" dirty="0"/>
-              <a:t> Service Plan - Demo</a:t>
-            </a:r>
+              <a:t>Apps</a:t>
+            </a:r>
+            <a:endParaRPr lang="nb-NO" dirty="0"/>
           </a:p>
         </p:txBody>
       </p:sp>
     </p:spTree>
     <p:extLst>
       <p:ext uri="{BB962C8B-B14F-4D97-AF65-F5344CB8AC3E}">
-        <p14:creationId xmlns:p14="http://schemas.microsoft.com/office/powerpoint/2010/main" val="2537136117"/>
+        <p14:creationId xmlns:p14="http://schemas.microsoft.com/office/powerpoint/2010/main" val="641098532"/>
       </p:ext>
     </p:extLst>
   </p:cSld>
@@ -15507,6 +15651,94 @@
 </file>
 
 <file path=ppt/slides/slide20.xml><?xml version="1.0" encoding="utf-8"?>
+<p:sld xmlns:a="http://schemas.openxmlformats.org/drawingml/2006/main" xmlns:r="http://schemas.openxmlformats.org/officeDocument/2006/relationships" xmlns:p="http://schemas.openxmlformats.org/presentationml/2006/main">
+  <p:cSld>
+    <p:spTree>
+      <p:nvGrpSpPr>
+        <p:cNvPr id="1" name=""/>
+        <p:cNvGrpSpPr/>
+        <p:nvPr/>
+      </p:nvGrpSpPr>
+      <p:grpSpPr>
+        <a:xfrm>
+          <a:off x="0" y="0"/>
+          <a:ext cx="0" cy="0"/>
+          <a:chOff x="0" y="0"/>
+          <a:chExt cx="0" cy="0"/>
+        </a:xfrm>
+      </p:grpSpPr>
+      <p:sp>
+        <p:nvSpPr>
+          <p:cNvPr id="2" name="Content Placeholder 1">
+            <a:extLst>
+              <a:ext uri="{FF2B5EF4-FFF2-40B4-BE49-F238E27FC236}">
+                <a16:creationId xmlns:a16="http://schemas.microsoft.com/office/drawing/2014/main" id="{DDB7E498-3C4D-40F4-9886-096A6156A712}"/>
+              </a:ext>
+            </a:extLst>
+          </p:cNvPr>
+          <p:cNvSpPr>
+            <a:spLocks noGrp="1"/>
+          </p:cNvSpPr>
+          <p:nvPr>
+            <p:ph idx="1"/>
+          </p:nvPr>
+        </p:nvSpPr>
+        <p:spPr/>
+        <p:txBody>
+          <a:bodyPr/>
+          <a:lstStyle/>
+          <a:p>
+            <a:pPr lvl="1"/>
+            <a:endParaRPr lang="nb-NO" dirty="0"/>
+          </a:p>
+        </p:txBody>
+      </p:sp>
+      <p:sp>
+        <p:nvSpPr>
+          <p:cNvPr id="3" name="Title 2">
+            <a:extLst>
+              <a:ext uri="{FF2B5EF4-FFF2-40B4-BE49-F238E27FC236}">
+                <a16:creationId xmlns:a16="http://schemas.microsoft.com/office/drawing/2014/main" id="{FF17F895-AE5B-489F-851C-DF70FA11E094}"/>
+              </a:ext>
+            </a:extLst>
+          </p:cNvPr>
+          <p:cNvSpPr>
+            <a:spLocks noGrp="1"/>
+          </p:cNvSpPr>
+          <p:nvPr>
+            <p:ph type="title"/>
+          </p:nvPr>
+        </p:nvSpPr>
+        <p:spPr/>
+        <p:txBody>
+          <a:bodyPr/>
+          <a:lstStyle/>
+          <a:p>
+            <a:r>
+              <a:rPr lang="nb-NO" dirty="0" err="1"/>
+              <a:t>App</a:t>
+            </a:r>
+            <a:r>
+              <a:rPr lang="nb-NO" dirty="0"/>
+              <a:t> Service Plan - Demo</a:t>
+            </a:r>
+          </a:p>
+        </p:txBody>
+      </p:sp>
+    </p:spTree>
+    <p:extLst>
+      <p:ext uri="{BB962C8B-B14F-4D97-AF65-F5344CB8AC3E}">
+        <p14:creationId xmlns:p14="http://schemas.microsoft.com/office/powerpoint/2010/main" val="2537136117"/>
+      </p:ext>
+    </p:extLst>
+  </p:cSld>
+  <p:clrMapOvr>
+    <a:masterClrMapping/>
+  </p:clrMapOvr>
+</p:sld>
+</file>
+
+<file path=ppt/slides/slide21.xml><?xml version="1.0" encoding="utf-8"?>
 <p:sld xmlns:a="http://schemas.openxmlformats.org/drawingml/2006/main" xmlns:r="http://schemas.openxmlformats.org/officeDocument/2006/relationships" xmlns:p="http://schemas.openxmlformats.org/presentationml/2006/main">
   <p:cSld>
     <p:spTree>
@@ -15690,131 +15922,6 @@
 </p:sld>
 </file>
 
-<file path=ppt/slides/slide21.xml><?xml version="1.0" encoding="utf-8"?>
-<p:sld xmlns:a="http://schemas.openxmlformats.org/drawingml/2006/main" xmlns:r="http://schemas.openxmlformats.org/officeDocument/2006/relationships" xmlns:p="http://schemas.openxmlformats.org/presentationml/2006/main">
-  <p:cSld>
-    <p:spTree>
-      <p:nvGrpSpPr>
-        <p:cNvPr id="1" name=""/>
-        <p:cNvGrpSpPr/>
-        <p:nvPr/>
-      </p:nvGrpSpPr>
-      <p:grpSpPr>
-        <a:xfrm>
-          <a:off x="0" y="0"/>
-          <a:ext cx="0" cy="0"/>
-          <a:chOff x="0" y="0"/>
-          <a:chExt cx="0" cy="0"/>
-        </a:xfrm>
-      </p:grpSpPr>
-      <p:sp>
-        <p:nvSpPr>
-          <p:cNvPr id="2" name="Content Placeholder 1">
-            <a:extLst>
-              <a:ext uri="{FF2B5EF4-FFF2-40B4-BE49-F238E27FC236}">
-                <a16:creationId xmlns:a16="http://schemas.microsoft.com/office/drawing/2014/main" id="{1F79401F-EEF2-4234-884F-6B9F884FA979}"/>
-              </a:ext>
-            </a:extLst>
-          </p:cNvPr>
-          <p:cNvSpPr>
-            <a:spLocks noGrp="1"/>
-          </p:cNvSpPr>
-          <p:nvPr>
-            <p:ph idx="1"/>
-          </p:nvPr>
-        </p:nvSpPr>
-        <p:spPr/>
-        <p:txBody>
-          <a:bodyPr/>
-          <a:lstStyle/>
-          <a:p>
-            <a:r>
-              <a:rPr lang="nb-NO" dirty="0"/>
-              <a:t>Tjeneste </a:t>
-            </a:r>
-          </a:p>
-          <a:p>
-            <a:r>
-              <a:rPr lang="nb-NO" dirty="0"/>
-              <a:t>Sikker lagring av </a:t>
-            </a:r>
-            <a:r>
-              <a:rPr lang="nb-NO" dirty="0" err="1"/>
-              <a:t>secrets</a:t>
-            </a:r>
-            <a:r>
-              <a:rPr lang="nb-NO" dirty="0"/>
-              <a:t> (f.eks. passord) og sertifikater i Azure</a:t>
-            </a:r>
-          </a:p>
-          <a:p>
-            <a:endParaRPr lang="nb-NO" dirty="0"/>
-          </a:p>
-          <a:p>
-            <a:endParaRPr lang="nb-NO" dirty="0"/>
-          </a:p>
-          <a:p>
-            <a:endParaRPr lang="nb-NO" dirty="0"/>
-          </a:p>
-          <a:p>
-            <a:endParaRPr lang="nb-NO" dirty="0"/>
-          </a:p>
-          <a:p>
-            <a:endParaRPr lang="nb-NO" dirty="0"/>
-          </a:p>
-          <a:p>
-            <a:r>
-              <a:rPr lang="nb-NO" dirty="0"/>
-              <a:t>Demo</a:t>
-            </a:r>
-          </a:p>
-          <a:p>
-            <a:endParaRPr lang="nb-NO" dirty="0"/>
-          </a:p>
-        </p:txBody>
-      </p:sp>
-      <p:sp>
-        <p:nvSpPr>
-          <p:cNvPr id="3" name="Title 2">
-            <a:extLst>
-              <a:ext uri="{FF2B5EF4-FFF2-40B4-BE49-F238E27FC236}">
-                <a16:creationId xmlns:a16="http://schemas.microsoft.com/office/drawing/2014/main" id="{67F3484C-440F-4FA5-8833-85E89A9F8F08}"/>
-              </a:ext>
-            </a:extLst>
-          </p:cNvPr>
-          <p:cNvSpPr>
-            <a:spLocks noGrp="1"/>
-          </p:cNvSpPr>
-          <p:nvPr>
-            <p:ph type="title"/>
-          </p:nvPr>
-        </p:nvSpPr>
-        <p:spPr/>
-        <p:txBody>
-          <a:bodyPr/>
-          <a:lstStyle/>
-          <a:p>
-            <a:r>
-              <a:rPr lang="nb-NO" dirty="0" err="1"/>
-              <a:t>KeyVault</a:t>
-            </a:r>
-            <a:endParaRPr lang="nb-NO" dirty="0"/>
-          </a:p>
-        </p:txBody>
-      </p:sp>
-    </p:spTree>
-    <p:extLst>
-      <p:ext uri="{BB962C8B-B14F-4D97-AF65-F5344CB8AC3E}">
-        <p14:creationId xmlns:p14="http://schemas.microsoft.com/office/powerpoint/2010/main" val="881317300"/>
-      </p:ext>
-    </p:extLst>
-  </p:cSld>
-  <p:clrMapOvr>
-    <a:masterClrMapping/>
-  </p:clrMapOvr>
-</p:sld>
-</file>
-
 <file path=ppt/slides/slide22.xml><?xml version="1.0" encoding="utf-8"?>
 <p:sld xmlns:a="http://schemas.openxmlformats.org/drawingml/2006/main" xmlns:r="http://schemas.openxmlformats.org/officeDocument/2006/relationships" xmlns:p="http://schemas.openxmlformats.org/presentationml/2006/main">
   <p:cSld>
@@ -15837,7 +15944,7 @@
           <p:cNvPr id="2" name="Content Placeholder 1">
             <a:extLst>
               <a:ext uri="{FF2B5EF4-FFF2-40B4-BE49-F238E27FC236}">
-                <a16:creationId xmlns:a16="http://schemas.microsoft.com/office/drawing/2014/main" id="{80AA05E5-BB1E-4E59-B3A6-8050741140A1}"/>
+                <a16:creationId xmlns:a16="http://schemas.microsoft.com/office/drawing/2014/main" id="{1F79401F-EEF2-4234-884F-6B9F884FA979}"/>
               </a:ext>
             </a:extLst>
           </p:cNvPr>
@@ -15853,7 +15960,48 @@
           <a:bodyPr/>
           <a:lstStyle/>
           <a:p>
-            <a:endParaRPr lang="nb-NO"/>
+            <a:r>
+              <a:rPr lang="nb-NO" dirty="0"/>
+              <a:t>Tjeneste </a:t>
+            </a:r>
+          </a:p>
+          <a:p>
+            <a:r>
+              <a:rPr lang="nb-NO" dirty="0"/>
+              <a:t>Sikker lagring av </a:t>
+            </a:r>
+            <a:r>
+              <a:rPr lang="nb-NO" dirty="0" err="1"/>
+              <a:t>secrets</a:t>
+            </a:r>
+            <a:r>
+              <a:rPr lang="nb-NO" dirty="0"/>
+              <a:t> (f.eks. passord) og sertifikater i Azure</a:t>
+            </a:r>
+          </a:p>
+          <a:p>
+            <a:endParaRPr lang="nb-NO" dirty="0"/>
+          </a:p>
+          <a:p>
+            <a:endParaRPr lang="nb-NO" dirty="0"/>
+          </a:p>
+          <a:p>
+            <a:endParaRPr lang="nb-NO" dirty="0"/>
+          </a:p>
+          <a:p>
+            <a:endParaRPr lang="nb-NO" dirty="0"/>
+          </a:p>
+          <a:p>
+            <a:endParaRPr lang="nb-NO" dirty="0"/>
+          </a:p>
+          <a:p>
+            <a:r>
+              <a:rPr lang="nb-NO" dirty="0"/>
+              <a:t>Demo</a:t>
+            </a:r>
+          </a:p>
+          <a:p>
+            <a:endParaRPr lang="nb-NO" dirty="0"/>
           </a:p>
         </p:txBody>
       </p:sp>
@@ -15862,7 +16010,7 @@
           <p:cNvPr id="3" name="Title 2">
             <a:extLst>
               <a:ext uri="{FF2B5EF4-FFF2-40B4-BE49-F238E27FC236}">
-                <a16:creationId xmlns:a16="http://schemas.microsoft.com/office/drawing/2014/main" id="{36AE5D29-1F11-4D5C-A83E-B7CDA2A2069C}"/>
+                <a16:creationId xmlns:a16="http://schemas.microsoft.com/office/drawing/2014/main" id="{67F3484C-440F-4FA5-8833-85E89A9F8F08}"/>
               </a:ext>
             </a:extLst>
           </p:cNvPr>
@@ -15879,24 +16027,17 @@
           <a:lstStyle/>
           <a:p>
             <a:r>
-              <a:rPr lang="nb-NO" dirty="0"/>
-              <a:t>Key </a:t>
-            </a:r>
-            <a:r>
               <a:rPr lang="nb-NO" dirty="0" err="1"/>
-              <a:t>Vault</a:t>
-            </a:r>
-            <a:r>
-              <a:rPr lang="nb-NO" dirty="0"/>
-              <a:t> Demo</a:t>
-            </a:r>
+              <a:t>KeyVault</a:t>
+            </a:r>
+            <a:endParaRPr lang="nb-NO" dirty="0"/>
           </a:p>
         </p:txBody>
       </p:sp>
     </p:spTree>
     <p:extLst>
       <p:ext uri="{BB962C8B-B14F-4D97-AF65-F5344CB8AC3E}">
-        <p14:creationId xmlns:p14="http://schemas.microsoft.com/office/powerpoint/2010/main" val="607609166"/>
+        <p14:creationId xmlns:p14="http://schemas.microsoft.com/office/powerpoint/2010/main" val="881317300"/>
       </p:ext>
     </p:extLst>
   </p:cSld>
@@ -15928,7 +16069,7 @@
           <p:cNvPr id="2" name="Content Placeholder 1">
             <a:extLst>
               <a:ext uri="{FF2B5EF4-FFF2-40B4-BE49-F238E27FC236}">
-                <a16:creationId xmlns:a16="http://schemas.microsoft.com/office/drawing/2014/main" id="{D490908C-9173-4AFD-8FE0-364E1E34A7C0}"/>
+                <a16:creationId xmlns:a16="http://schemas.microsoft.com/office/drawing/2014/main" id="{80AA05E5-BB1E-4E59-B3A6-8050741140A1}"/>
               </a:ext>
             </a:extLst>
           </p:cNvPr>
@@ -15944,90 +16085,7 @@
           <a:bodyPr/>
           <a:lstStyle/>
           <a:p>
-            <a:r>
-              <a:rPr lang="nb-NO" dirty="0"/>
-              <a:t>Azure SQL Database</a:t>
-            </a:r>
-          </a:p>
-          <a:p>
-            <a:pPr lvl="1"/>
-            <a:r>
-              <a:rPr lang="nb-NO" dirty="0"/>
-              <a:t>SQL Server (</a:t>
-            </a:r>
-            <a:r>
-              <a:rPr lang="nb-NO" dirty="0" err="1"/>
-              <a:t>light</a:t>
-            </a:r>
-            <a:r>
-              <a:rPr lang="nb-NO" dirty="0"/>
-              <a:t>) som tjeneste i skyen</a:t>
-            </a:r>
-          </a:p>
-          <a:p>
-            <a:r>
-              <a:rPr lang="nb-NO" dirty="0"/>
-              <a:t>Cosmos DB</a:t>
-            </a:r>
-          </a:p>
-          <a:p>
-            <a:pPr lvl="1"/>
-            <a:r>
-              <a:rPr lang="nb-NO" dirty="0"/>
-              <a:t>No-SQL-database</a:t>
-            </a:r>
-          </a:p>
-          <a:p>
-            <a:pPr lvl="1"/>
-            <a:r>
-              <a:rPr lang="nb-NO" dirty="0"/>
-              <a:t>API: </a:t>
-            </a:r>
-            <a:r>
-              <a:rPr lang="nb-NO" dirty="0" err="1"/>
-              <a:t>Sql</a:t>
-            </a:r>
-            <a:r>
-              <a:rPr lang="nb-NO" dirty="0"/>
-              <a:t> API, </a:t>
-            </a:r>
-            <a:r>
-              <a:rPr lang="nb-NO" dirty="0" err="1"/>
-              <a:t>Table</a:t>
-            </a:r>
-            <a:r>
-              <a:rPr lang="nb-NO" dirty="0"/>
-              <a:t> Storage API</a:t>
-            </a:r>
-          </a:p>
-          <a:p>
-            <a:r>
-              <a:rPr lang="nb-NO" dirty="0"/>
-              <a:t>Azure Storage</a:t>
-            </a:r>
-          </a:p>
-          <a:p>
-            <a:pPr lvl="1"/>
-            <a:endParaRPr lang="nb-NO" dirty="0"/>
-          </a:p>
-          <a:p>
-            <a:pPr lvl="1"/>
-            <a:endParaRPr lang="nb-NO" dirty="0"/>
-          </a:p>
-          <a:p>
-            <a:r>
-              <a:rPr lang="nb-NO" dirty="0" err="1"/>
-              <a:t>Polyglot</a:t>
-            </a:r>
-            <a:r>
-              <a:rPr lang="nb-NO" dirty="0"/>
-              <a:t> </a:t>
-            </a:r>
-            <a:r>
-              <a:rPr lang="nb-NO" dirty="0" err="1"/>
-              <a:t>storage</a:t>
-            </a:r>
-            <a:endParaRPr lang="nb-NO" dirty="0"/>
+            <a:endParaRPr lang="nb-NO"/>
           </a:p>
         </p:txBody>
       </p:sp>
@@ -16036,7 +16094,7 @@
           <p:cNvPr id="3" name="Title 2">
             <a:extLst>
               <a:ext uri="{FF2B5EF4-FFF2-40B4-BE49-F238E27FC236}">
-                <a16:creationId xmlns:a16="http://schemas.microsoft.com/office/drawing/2014/main" id="{2D643F29-E495-45DA-8818-6E3C14AAC138}"/>
+                <a16:creationId xmlns:a16="http://schemas.microsoft.com/office/drawing/2014/main" id="{36AE5D29-1F11-4D5C-A83E-B7CDA2A2069C}"/>
               </a:ext>
             </a:extLst>
           </p:cNvPr>
@@ -16054,7 +16112,15 @@
           <a:p>
             <a:r>
               <a:rPr lang="nb-NO" dirty="0"/>
-              <a:t>Lagring i Azure</a:t>
+              <a:t>Key </a:t>
+            </a:r>
+            <a:r>
+              <a:rPr lang="nb-NO" dirty="0" err="1"/>
+              <a:t>Vault</a:t>
+            </a:r>
+            <a:r>
+              <a:rPr lang="nb-NO" dirty="0"/>
+              <a:t> Demo</a:t>
             </a:r>
           </a:p>
         </p:txBody>
@@ -16062,7 +16128,7 @@
     </p:spTree>
     <p:extLst>
       <p:ext uri="{BB962C8B-B14F-4D97-AF65-F5344CB8AC3E}">
-        <p14:creationId xmlns:p14="http://schemas.microsoft.com/office/powerpoint/2010/main" val="2592611348"/>
+        <p14:creationId xmlns:p14="http://schemas.microsoft.com/office/powerpoint/2010/main" val="607609166"/>
       </p:ext>
     </p:extLst>
   </p:cSld>
@@ -16094,7 +16160,7 @@
           <p:cNvPr id="2" name="Content Placeholder 1">
             <a:extLst>
               <a:ext uri="{FF2B5EF4-FFF2-40B4-BE49-F238E27FC236}">
-                <a16:creationId xmlns:a16="http://schemas.microsoft.com/office/drawing/2014/main" id="{84881E36-17DD-47AC-9D31-D92677B39250}"/>
+                <a16:creationId xmlns:a16="http://schemas.microsoft.com/office/drawing/2014/main" id="{D490908C-9173-4AFD-8FE0-364E1E34A7C0}"/>
               </a:ext>
             </a:extLst>
           </p:cNvPr>
@@ -16112,56 +16178,91 @@
           <a:p>
             <a:r>
               <a:rPr lang="nb-NO" dirty="0"/>
-              <a:t>En Storage </a:t>
+              <a:t>Azure SQL Database</a:t>
+            </a:r>
+          </a:p>
+          <a:p>
+            <a:pPr lvl="1"/>
+            <a:r>
+              <a:rPr lang="nb-NO" dirty="0"/>
+              <a:t>SQL Server (</a:t>
             </a:r>
             <a:r>
               <a:rPr lang="nb-NO" dirty="0" err="1"/>
-              <a:t>Account</a:t>
-            </a:r>
-            <a:r>
-              <a:rPr lang="nb-NO" dirty="0"/>
-              <a:t> kan </a:t>
+              <a:t>light</a:t>
+            </a:r>
+            <a:r>
+              <a:rPr lang="nb-NO" dirty="0"/>
+              <a:t>) som tjeneste i skyen</a:t>
+            </a:r>
+          </a:p>
+          <a:p>
+            <a:r>
+              <a:rPr lang="nb-NO" dirty="0"/>
+              <a:t>Cosmos DB</a:t>
             </a:r>
           </a:p>
           <a:p>
             <a:pPr lvl="1"/>
             <a:r>
+              <a:rPr lang="nb-NO" dirty="0"/>
+              <a:t>No-SQL-database</a:t>
+            </a:r>
+          </a:p>
+          <a:p>
+            <a:pPr lvl="1"/>
+            <a:r>
+              <a:rPr lang="nb-NO" dirty="0"/>
+              <a:t>API: </a:t>
+            </a:r>
+            <a:r>
               <a:rPr lang="nb-NO" dirty="0" err="1"/>
-              <a:t>Tables</a:t>
-            </a:r>
-            <a:endParaRPr lang="nb-NO" dirty="0"/>
-          </a:p>
-          <a:p>
-            <a:pPr lvl="1"/>
+              <a:t>Sql</a:t>
+            </a:r>
+            <a:r>
+              <a:rPr lang="nb-NO" dirty="0"/>
+              <a:t> API, </a:t>
+            </a:r>
             <a:r>
               <a:rPr lang="nb-NO" dirty="0" err="1"/>
-              <a:t>Blobs</a:t>
-            </a:r>
-            <a:endParaRPr lang="nb-NO" dirty="0"/>
-          </a:p>
-          <a:p>
-            <a:pPr lvl="1"/>
-            <a:r>
-              <a:rPr lang="nb-NO" dirty="0"/>
-              <a:t>Files		</a:t>
-            </a:r>
-          </a:p>
-          <a:p>
-            <a:pPr lvl="1"/>
-            <a:r>
-              <a:rPr lang="nb-NO" dirty="0"/>
-              <a:t>Queues</a:t>
-            </a:r>
-          </a:p>
-          <a:p>
-            <a:r>
-              <a:rPr lang="nb-NO" dirty="0"/>
-              <a:t>Flere måter å </a:t>
+              <a:t>Table</a:t>
+            </a:r>
+            <a:r>
+              <a:rPr lang="nb-NO" dirty="0"/>
+              <a:t> Storage API</a:t>
+            </a:r>
+          </a:p>
+          <a:p>
+            <a:r>
+              <a:rPr lang="nb-NO" dirty="0"/>
+              <a:t>Azure Storage</a:t>
             </a:r>
           </a:p>
           <a:p>
             <a:pPr lvl="1"/>
             <a:endParaRPr lang="nb-NO" dirty="0"/>
+          </a:p>
+          <a:p>
+            <a:pPr lvl="1"/>
+            <a:endParaRPr lang="nb-NO" dirty="0"/>
+          </a:p>
+          <a:p>
+            <a:r>
+              <a:rPr lang="nb-NO" dirty="0" err="1"/>
+              <a:t>Polyglot</a:t>
+            </a:r>
+            <a:r>
+              <a:rPr lang="nb-NO" dirty="0"/>
+              <a:t> </a:t>
+            </a:r>
+            <a:r>
+              <a:rPr lang="nb-NO" dirty="0" err="1"/>
+              <a:t>storage</a:t>
+            </a:r>
+            <a:r>
+              <a:rPr lang="nb-NO" dirty="0"/>
+              <a:t>: Velger flere lagringsteknologier i et system for å utnytte </a:t>
+            </a:r>
           </a:p>
         </p:txBody>
       </p:sp>
@@ -16170,7 +16271,7 @@
           <p:cNvPr id="3" name="Title 2">
             <a:extLst>
               <a:ext uri="{FF2B5EF4-FFF2-40B4-BE49-F238E27FC236}">
-                <a16:creationId xmlns:a16="http://schemas.microsoft.com/office/drawing/2014/main" id="{3A44980B-3341-43C3-A0A1-B3BFA4124E1E}"/>
+                <a16:creationId xmlns:a16="http://schemas.microsoft.com/office/drawing/2014/main" id="{2D643F29-E495-45DA-8818-6E3C14AAC138}"/>
               </a:ext>
             </a:extLst>
           </p:cNvPr>
@@ -16188,7 +16289,7 @@
           <a:p>
             <a:r>
               <a:rPr lang="nb-NO" dirty="0"/>
-              <a:t>Azure Storage</a:t>
+              <a:t>Lagring i Azure</a:t>
             </a:r>
           </a:p>
         </p:txBody>
@@ -16196,7 +16297,7 @@
     </p:spTree>
     <p:extLst>
       <p:ext uri="{BB962C8B-B14F-4D97-AF65-F5344CB8AC3E}">
-        <p14:creationId xmlns:p14="http://schemas.microsoft.com/office/powerpoint/2010/main" val="2901878225"/>
+        <p14:creationId xmlns:p14="http://schemas.microsoft.com/office/powerpoint/2010/main" val="2592611348"/>
       </p:ext>
     </p:extLst>
   </p:cSld>
@@ -16228,7 +16329,7 @@
           <p:cNvPr id="2" name="Content Placeholder 1">
             <a:extLst>
               <a:ext uri="{FF2B5EF4-FFF2-40B4-BE49-F238E27FC236}">
-                <a16:creationId xmlns:a16="http://schemas.microsoft.com/office/drawing/2014/main" id="{CAB297BF-582A-46FF-8394-92F3E72178C3}"/>
+                <a16:creationId xmlns:a16="http://schemas.microsoft.com/office/drawing/2014/main" id="{84881E36-17DD-47AC-9D31-D92677B39250}"/>
               </a:ext>
             </a:extLst>
           </p:cNvPr>
@@ -16246,104 +16347,81 @@
           <a:p>
             <a:r>
               <a:rPr lang="nb-NO" dirty="0"/>
-              <a:t>Lagrer filer i Containere i en Storage </a:t>
+              <a:t>En Storage </a:t>
             </a:r>
             <a:r>
               <a:rPr lang="nb-NO" dirty="0" err="1"/>
-              <a:t>account</a:t>
+              <a:t>Account</a:t>
+            </a:r>
+            <a:r>
+              <a:rPr lang="nb-NO" dirty="0"/>
+              <a:t> kan inneholde</a:t>
+            </a:r>
+          </a:p>
+          <a:p>
+            <a:pPr lvl="1"/>
+            <a:r>
+              <a:rPr lang="nb-NO" dirty="0" err="1"/>
+              <a:t>Tables</a:t>
             </a:r>
             <a:endParaRPr lang="nb-NO" dirty="0"/>
           </a:p>
           <a:p>
-            <a:r>
-              <a:rPr lang="nb-NO" dirty="0"/>
-              <a:t>Virtuell katalogstruktur</a:t>
-            </a:r>
-          </a:p>
-          <a:p>
+            <a:pPr lvl="1"/>
+            <a:r>
+              <a:rPr lang="nb-NO" dirty="0" err="1"/>
+              <a:t>Blobs</a:t>
+            </a:r>
             <a:endParaRPr lang="nb-NO" dirty="0"/>
           </a:p>
           <a:p>
-            <a:r>
-              <a:rPr lang="nb-NO" dirty="0"/>
-              <a:t>Støtte for SAS-tokens:</a:t>
-            </a:r>
-          </a:p>
-          <a:p>
             <a:pPr lvl="1"/>
             <a:r>
+              <a:rPr lang="nb-NO" dirty="0"/>
+              <a:t>Files		</a:t>
+            </a:r>
+          </a:p>
+          <a:p>
+            <a:pPr lvl="1"/>
+            <a:r>
+              <a:rPr lang="nb-NO" dirty="0"/>
+              <a:t>Queues</a:t>
+            </a:r>
+          </a:p>
+          <a:p>
+            <a:r>
               <a:rPr lang="nb-NO" dirty="0" err="1"/>
-              <a:t>Shared</a:t>
-            </a:r>
-            <a:r>
-              <a:rPr lang="nb-NO" dirty="0"/>
-              <a:t>-Access </a:t>
+              <a:t>Backup</a:t>
+            </a:r>
+            <a:endParaRPr lang="nb-NO" dirty="0"/>
+          </a:p>
+          <a:p>
+            <a:pPr lvl="1"/>
+            <a:r>
+              <a:rPr lang="nb-NO" dirty="0"/>
+              <a:t>LRS, GRS</a:t>
+            </a:r>
+          </a:p>
+          <a:p>
+            <a:pPr lvl="1"/>
+            <a:r>
+              <a:rPr lang="nb-NO" dirty="0"/>
+              <a:t>Ingen generell </a:t>
             </a:r>
             <a:r>
               <a:rPr lang="nb-NO" dirty="0" err="1"/>
-              <a:t>Signature</a:t>
-            </a:r>
-            <a:r>
-              <a:rPr lang="nb-NO" dirty="0"/>
-              <a:t> – gir</a:t>
-            </a:r>
-          </a:p>
-          <a:p>
-            <a:pPr lvl="1"/>
-            <a:r>
-              <a:rPr lang="nb-NO" dirty="0"/>
-              <a:t>Eneste måten å dele </a:t>
-            </a:r>
-            <a:r>
-              <a:rPr lang="nb-NO" dirty="0" err="1"/>
-              <a:t>blobs</a:t>
-            </a:r>
-            <a:r>
-              <a:rPr lang="nb-NO" dirty="0"/>
-              <a:t> på uten å gi vekk </a:t>
-            </a:r>
-            <a:r>
-              <a:rPr lang="nb-NO" dirty="0" err="1"/>
-              <a:t>Account-key</a:t>
-            </a:r>
-            <a:r>
-              <a:rPr lang="nb-NO" dirty="0"/>
-              <a:t> eller gjøre de fullt </a:t>
-            </a:r>
-            <a:r>
-              <a:rPr lang="nb-NO" dirty="0" err="1"/>
-              <a:t>public</a:t>
-            </a:r>
+              <a:t>backup</a:t>
+            </a:r>
+            <a:r>
+              <a:rPr lang="nb-NO" dirty="0"/>
+              <a:t> mot f.eks. feilaktig sletting fra bruker</a:t>
+            </a:r>
+          </a:p>
+          <a:p>
+            <a:pPr marL="0" indent="0">
+              <a:buNone/>
+            </a:pPr>
             <a:endParaRPr lang="nb-NO" dirty="0"/>
-          </a:p>
-          <a:p>
-            <a:pPr lvl="1"/>
-            <a:r>
-              <a:rPr lang="nb-NO" dirty="0"/>
-              <a:t>Read-Write-</a:t>
-            </a:r>
-            <a:r>
-              <a:rPr lang="nb-NO" dirty="0" err="1"/>
-              <a:t>Delete</a:t>
-            </a:r>
-            <a:r>
-              <a:rPr lang="nb-NO" dirty="0"/>
-              <a:t>-List</a:t>
-            </a:r>
-          </a:p>
-          <a:p>
-            <a:pPr lvl="1"/>
-            <a:r>
-              <a:rPr lang="nb-NO" dirty="0"/>
-              <a:t>Gyldig fra-til</a:t>
-            </a:r>
-          </a:p>
-          <a:p>
-            <a:pPr lvl="1"/>
-            <a:r>
-              <a:rPr lang="nb-NO" dirty="0"/>
-              <a:t>IP-restriksjoner </a:t>
-            </a:r>
           </a:p>
           <a:p>
             <a:pPr lvl="1"/>
@@ -16356,7 +16434,7 @@
           <p:cNvPr id="3" name="Title 2">
             <a:extLst>
               <a:ext uri="{FF2B5EF4-FFF2-40B4-BE49-F238E27FC236}">
-                <a16:creationId xmlns:a16="http://schemas.microsoft.com/office/drawing/2014/main" id="{E37AEFC3-3D48-4189-ABC2-65C8CD28CADC}"/>
+                <a16:creationId xmlns:a16="http://schemas.microsoft.com/office/drawing/2014/main" id="{3A44980B-3341-43C3-A0A1-B3BFA4124E1E}"/>
               </a:ext>
             </a:extLst>
           </p:cNvPr>
@@ -16374,20 +16452,15 @@
           <a:p>
             <a:r>
               <a:rPr lang="nb-NO" dirty="0"/>
-              <a:t>Azure </a:t>
-            </a:r>
-            <a:r>
-              <a:rPr lang="nb-NO" dirty="0" err="1"/>
-              <a:t>Blobs</a:t>
-            </a:r>
-            <a:endParaRPr lang="nb-NO" dirty="0"/>
+              <a:t>Azure Storage</a:t>
+            </a:r>
           </a:p>
         </p:txBody>
       </p:sp>
     </p:spTree>
     <p:extLst>
       <p:ext uri="{BB962C8B-B14F-4D97-AF65-F5344CB8AC3E}">
-        <p14:creationId xmlns:p14="http://schemas.microsoft.com/office/powerpoint/2010/main" val="508552992"/>
+        <p14:creationId xmlns:p14="http://schemas.microsoft.com/office/powerpoint/2010/main" val="2901878225"/>
       </p:ext>
     </p:extLst>
   </p:cSld>
@@ -16419,6 +16492,197 @@
           <p:cNvPr id="2" name="Content Placeholder 1">
             <a:extLst>
               <a:ext uri="{FF2B5EF4-FFF2-40B4-BE49-F238E27FC236}">
+                <a16:creationId xmlns:a16="http://schemas.microsoft.com/office/drawing/2014/main" id="{CAB297BF-582A-46FF-8394-92F3E72178C3}"/>
+              </a:ext>
+            </a:extLst>
+          </p:cNvPr>
+          <p:cNvSpPr>
+            <a:spLocks noGrp="1"/>
+          </p:cNvSpPr>
+          <p:nvPr>
+            <p:ph idx="1"/>
+          </p:nvPr>
+        </p:nvSpPr>
+        <p:spPr/>
+        <p:txBody>
+          <a:bodyPr/>
+          <a:lstStyle/>
+          <a:p>
+            <a:r>
+              <a:rPr lang="nb-NO" dirty="0"/>
+              <a:t>Lagrer filer i Containere i en Storage </a:t>
+            </a:r>
+            <a:r>
+              <a:rPr lang="nb-NO" dirty="0" err="1"/>
+              <a:t>account</a:t>
+            </a:r>
+            <a:endParaRPr lang="nb-NO" dirty="0"/>
+          </a:p>
+          <a:p>
+            <a:r>
+              <a:rPr lang="nb-NO" dirty="0"/>
+              <a:t>Virtuell katalogstruktur</a:t>
+            </a:r>
+          </a:p>
+          <a:p>
+            <a:endParaRPr lang="nb-NO" dirty="0"/>
+          </a:p>
+          <a:p>
+            <a:r>
+              <a:rPr lang="nb-NO" dirty="0"/>
+              <a:t>Støtte for SAS-tokens:</a:t>
+            </a:r>
+          </a:p>
+          <a:p>
+            <a:pPr lvl="1"/>
+            <a:r>
+              <a:rPr lang="nb-NO" dirty="0" err="1"/>
+              <a:t>Shared</a:t>
+            </a:r>
+            <a:r>
+              <a:rPr lang="nb-NO" dirty="0"/>
+              <a:t>-Access </a:t>
+            </a:r>
+            <a:r>
+              <a:rPr lang="nb-NO" dirty="0" err="1"/>
+              <a:t>Signature</a:t>
+            </a:r>
+            <a:r>
+              <a:rPr lang="nb-NO" dirty="0"/>
+              <a:t> – gir</a:t>
+            </a:r>
+          </a:p>
+          <a:p>
+            <a:pPr lvl="1"/>
+            <a:r>
+              <a:rPr lang="nb-NO" dirty="0"/>
+              <a:t>Eneste måten å dele </a:t>
+            </a:r>
+            <a:r>
+              <a:rPr lang="nb-NO" dirty="0" err="1"/>
+              <a:t>blobs</a:t>
+            </a:r>
+            <a:r>
+              <a:rPr lang="nb-NO" dirty="0"/>
+              <a:t> på uten å gi vekk </a:t>
+            </a:r>
+            <a:r>
+              <a:rPr lang="nb-NO" dirty="0" err="1"/>
+              <a:t>Account-key</a:t>
+            </a:r>
+            <a:r>
+              <a:rPr lang="nb-NO" dirty="0"/>
+              <a:t> eller gjøre de fullt </a:t>
+            </a:r>
+            <a:r>
+              <a:rPr lang="nb-NO" dirty="0" err="1"/>
+              <a:t>public</a:t>
+            </a:r>
+            <a:endParaRPr lang="nb-NO" dirty="0"/>
+          </a:p>
+          <a:p>
+            <a:pPr lvl="1"/>
+            <a:r>
+              <a:rPr lang="nb-NO" dirty="0"/>
+              <a:t>Read-Write-</a:t>
+            </a:r>
+            <a:r>
+              <a:rPr lang="nb-NO" dirty="0" err="1"/>
+              <a:t>Delete</a:t>
+            </a:r>
+            <a:r>
+              <a:rPr lang="nb-NO" dirty="0"/>
+              <a:t>-List</a:t>
+            </a:r>
+          </a:p>
+          <a:p>
+            <a:pPr lvl="1"/>
+            <a:r>
+              <a:rPr lang="nb-NO" dirty="0"/>
+              <a:t>Gyldig fra-til</a:t>
+            </a:r>
+          </a:p>
+          <a:p>
+            <a:pPr lvl="1"/>
+            <a:r>
+              <a:rPr lang="nb-NO" dirty="0"/>
+              <a:t>IP-restriksjoner </a:t>
+            </a:r>
+          </a:p>
+          <a:p>
+            <a:pPr lvl="1"/>
+            <a:endParaRPr lang="nb-NO" dirty="0"/>
+          </a:p>
+        </p:txBody>
+      </p:sp>
+      <p:sp>
+        <p:nvSpPr>
+          <p:cNvPr id="3" name="Title 2">
+            <a:extLst>
+              <a:ext uri="{FF2B5EF4-FFF2-40B4-BE49-F238E27FC236}">
+                <a16:creationId xmlns:a16="http://schemas.microsoft.com/office/drawing/2014/main" id="{E37AEFC3-3D48-4189-ABC2-65C8CD28CADC}"/>
+              </a:ext>
+            </a:extLst>
+          </p:cNvPr>
+          <p:cNvSpPr>
+            <a:spLocks noGrp="1"/>
+          </p:cNvSpPr>
+          <p:nvPr>
+            <p:ph type="title"/>
+          </p:nvPr>
+        </p:nvSpPr>
+        <p:spPr/>
+        <p:txBody>
+          <a:bodyPr/>
+          <a:lstStyle/>
+          <a:p>
+            <a:r>
+              <a:rPr lang="nb-NO" dirty="0"/>
+              <a:t>Azure </a:t>
+            </a:r>
+            <a:r>
+              <a:rPr lang="nb-NO" dirty="0" err="1"/>
+              <a:t>Blobs</a:t>
+            </a:r>
+            <a:endParaRPr lang="nb-NO" dirty="0"/>
+          </a:p>
+        </p:txBody>
+      </p:sp>
+    </p:spTree>
+    <p:extLst>
+      <p:ext uri="{BB962C8B-B14F-4D97-AF65-F5344CB8AC3E}">
+        <p14:creationId xmlns:p14="http://schemas.microsoft.com/office/powerpoint/2010/main" val="508552992"/>
+      </p:ext>
+    </p:extLst>
+  </p:cSld>
+  <p:clrMapOvr>
+    <a:masterClrMapping/>
+  </p:clrMapOvr>
+</p:sld>
+</file>
+
+<file path=ppt/slides/slide27.xml><?xml version="1.0" encoding="utf-8"?>
+<p:sld xmlns:a="http://schemas.openxmlformats.org/drawingml/2006/main" xmlns:r="http://schemas.openxmlformats.org/officeDocument/2006/relationships" xmlns:p="http://schemas.openxmlformats.org/presentationml/2006/main">
+  <p:cSld>
+    <p:spTree>
+      <p:nvGrpSpPr>
+        <p:cNvPr id="1" name=""/>
+        <p:cNvGrpSpPr/>
+        <p:nvPr/>
+      </p:nvGrpSpPr>
+      <p:grpSpPr>
+        <a:xfrm>
+          <a:off x="0" y="0"/>
+          <a:ext cx="0" cy="0"/>
+          <a:chOff x="0" y="0"/>
+          <a:chExt cx="0" cy="0"/>
+        </a:xfrm>
+      </p:grpSpPr>
+      <p:sp>
+        <p:nvSpPr>
+          <p:cNvPr id="2" name="Content Placeholder 1">
+            <a:extLst>
+              <a:ext uri="{FF2B5EF4-FFF2-40B4-BE49-F238E27FC236}">
                 <a16:creationId xmlns:a16="http://schemas.microsoft.com/office/drawing/2014/main" id="{CB3D7126-09B8-439E-9A87-0615A359EEA9}"/>
               </a:ext>
             </a:extLst>
@@ -16564,7 +16828,7 @@
 </p:sld>
 </file>
 
-<file path=ppt/slides/slide27.xml><?xml version="1.0" encoding="utf-8"?>
+<file path=ppt/slides/slide28.xml><?xml version="1.0" encoding="utf-8"?>
 <p:sld xmlns:a="http://schemas.openxmlformats.org/drawingml/2006/main" xmlns:r="http://schemas.openxmlformats.org/officeDocument/2006/relationships" xmlns:p="http://schemas.openxmlformats.org/presentationml/2006/main">
   <p:cSld>
     <p:spTree>
@@ -19104,15 +19368,6 @@
 </file>
 
 <file path=customXml/item1.xml><?xml version="1.0" encoding="utf-8"?>
-<?mso-contentType ?>
-<FormTemplates xmlns="http://schemas.microsoft.com/sharepoint/v3/contenttype/forms">
-  <Display>DocumentLibraryForm</Display>
-  <Edit>DocumentLibraryForm</Edit>
-  <New>DocumentLibraryForm</New>
-</FormTemplates>
-</file>
-
-<file path=customXml/item2.xml><?xml version="1.0" encoding="utf-8"?>
 <ct:contentTypeSchema xmlns:ct="http://schemas.microsoft.com/office/2006/metadata/contentType" xmlns:ma="http://schemas.microsoft.com/office/2006/metadata/properties/metaAttributes" ct:_="" ma:_="" ma:contentTypeName="Document" ma:contentTypeID="0x0101005D3CE5A03C88D04F8FE0CC8617320B29" ma:contentTypeVersion="2" ma:contentTypeDescription="Create a new document." ma:contentTypeScope="" ma:versionID="23c508fadb5761cd27fdc7efc393bb78">
   <xsd:schema xmlns:xsd="http://www.w3.org/2001/XMLSchema" xmlns:xs="http://www.w3.org/2001/XMLSchema" xmlns:p="http://schemas.microsoft.com/office/2006/metadata/properties" xmlns:ns2="323bcd62-7d27-4513-9df1-9bc20f03554b" targetNamespace="http://schemas.microsoft.com/office/2006/metadata/properties" ma:root="true" ma:fieldsID="4120a6a9df7c81c23a4d646d2ccf1355" ns2:_="">
     <xsd:import namespace="323bcd62-7d27-4513-9df1-9bc20f03554b"/>
@@ -19244,6 +19499,15 @@
 </ct:contentTypeSchema>
 </file>
 
+<file path=customXml/item2.xml><?xml version="1.0" encoding="utf-8"?>
+<?mso-contentType ?>
+<FormTemplates xmlns="http://schemas.microsoft.com/sharepoint/v3/contenttype/forms">
+  <Display>DocumentLibraryForm</Display>
+  <Edit>DocumentLibraryForm</Edit>
+  <New>DocumentLibraryForm</New>
+</FormTemplates>
+</file>
+
 <file path=customXml/item3.xml><?xml version="1.0" encoding="utf-8"?>
 <p:properties xmlns:p="http://schemas.microsoft.com/office/2006/metadata/properties" xmlns:xsi="http://www.w3.org/2001/XMLSchema-instance" xmlns:pc="http://schemas.microsoft.com/office/infopath/2007/PartnerControls">
   <documentManagement/>
@@ -19251,14 +19515,6 @@
 </file>
 
 <file path=customXml/itemProps1.xml><?xml version="1.0" encoding="utf-8"?>
-<ds:datastoreItem xmlns:ds="http://schemas.openxmlformats.org/officeDocument/2006/customXml" ds:itemID="{BB82CC63-55FC-4D22-9ED3-DB88AF6228E1}">
-  <ds:schemaRefs>
-    <ds:schemaRef ds:uri="http://schemas.microsoft.com/sharepoint/v3/contenttype/forms"/>
-  </ds:schemaRefs>
-</ds:datastoreItem>
-</file>
-
-<file path=customXml/itemProps2.xml><?xml version="1.0" encoding="utf-8"?>
 <ds:datastoreItem xmlns:ds="http://schemas.openxmlformats.org/officeDocument/2006/customXml" ds:itemID="{0377EA4A-9170-43AD-A052-6EABC948F73F}">
   <ds:schemaRefs>
     <ds:schemaRef ds:uri="http://schemas.microsoft.com/office/2006/metadata/contentType"/>
@@ -19272,6 +19528,14 @@
     <ds:schemaRef ds:uri="http://purl.org/dc/elements/1.1/"/>
     <ds:schemaRef ds:uri="http://purl.org/dc/terms/"/>
     <ds:schemaRef ds:uri="http://schemas.microsoft.com/internal/obd"/>
+  </ds:schemaRefs>
+</ds:datastoreItem>
+</file>
+
+<file path=customXml/itemProps2.xml><?xml version="1.0" encoding="utf-8"?>
+<ds:datastoreItem xmlns:ds="http://schemas.openxmlformats.org/officeDocument/2006/customXml" ds:itemID="{BB82CC63-55FC-4D22-9ED3-DB88AF6228E1}">
+  <ds:schemaRefs>
+    <ds:schemaRef ds:uri="http://schemas.microsoft.com/sharepoint/v3/contenttype/forms"/>
   </ds:schemaRefs>
 </ds:datastoreItem>
 </file>

</xml_diff>

<commit_message>
Updated text. Mostly about Leksjon 2
</commit_message>
<xml_diff>
--- a/Workshop_1/Presentation/Azureskolen-Workshop#1.pptx
+++ b/Workshop_1/Presentation/Azureskolen-Workshop#1.pptx
@@ -19,9 +19,9 @@
     <p:sldId id="263" r:id="rId10"/>
     <p:sldId id="259" r:id="rId11"/>
     <p:sldId id="267" r:id="rId12"/>
-    <p:sldId id="261" r:id="rId13"/>
-    <p:sldId id="269" r:id="rId14"/>
-    <p:sldId id="262" r:id="rId15"/>
+    <p:sldId id="262" r:id="rId13"/>
+    <p:sldId id="261" r:id="rId14"/>
+    <p:sldId id="269" r:id="rId15"/>
     <p:sldId id="265" r:id="rId16"/>
     <p:sldId id="266" r:id="rId17"/>
     <p:sldId id="274" r:id="rId18"/>
@@ -32,15 +32,15 @@
     <p:sldId id="272" r:id="rId23"/>
     <p:sldId id="283" r:id="rId24"/>
     <p:sldId id="285" r:id="rId25"/>
-    <p:sldId id="278" r:id="rId26"/>
-    <p:sldId id="273" r:id="rId27"/>
+    <p:sldId id="273" r:id="rId26"/>
+    <p:sldId id="278" r:id="rId27"/>
     <p:sldId id="277" r:id="rId28"/>
     <p:sldId id="279" r:id="rId29"/>
     <p:sldId id="270" r:id="rId30"/>
     <p:sldId id="268" r:id="rId31"/>
     <p:sldId id="281" r:id="rId32"/>
     <p:sldId id="282" r:id="rId33"/>
-    <p:sldId id="284" r:id="rId34"/>
+    <p:sldId id="286" r:id="rId34"/>
   </p:sldIdLst>
   <p:sldSz cx="12192000" cy="6858000"/>
   <p:notesSz cx="6858000" cy="9144000"/>
@@ -243,7 +243,7 @@
           <a:p>
             <a:fld id="{54C52192-B826-4AE0-9CD6-BEA9467D12B3}" type="datetimeFigureOut">
               <a:rPr lang="nb-NO" smtClean="0"/>
-              <a:t>04.10.2018</a:t>
+              <a:t>08.10.2018</a:t>
             </a:fld>
             <a:endParaRPr lang="nb-NO"/>
           </a:p>
@@ -408,7 +408,7 @@
           <a:p>
             <a:fld id="{2696BCB2-2760-41B1-A1BE-7886EF110FCB}" type="datetimeFigureOut">
               <a:rPr lang="nb-NO" smtClean="0"/>
-              <a:t>04.10.2018</a:t>
+              <a:t>08.10.2018</a:t>
             </a:fld>
             <a:endParaRPr lang="nb-NO"/>
           </a:p>
@@ -1088,28 +1088,6 @@
           <a:bodyPr/>
           <a:lstStyle/>
           <a:p>
-            <a:pPr marL="171450" indent="-171450">
-              <a:buFontTx/>
-              <a:buChar char="-"/>
-            </a:pPr>
-            <a:r>
-              <a:rPr lang="nb-NO" dirty="0"/>
-              <a:t>Web </a:t>
-            </a:r>
-            <a:r>
-              <a:rPr lang="nb-NO" dirty="0" err="1"/>
-              <a:t>Apps</a:t>
-            </a:r>
-            <a:r>
-              <a:rPr lang="nb-NO" dirty="0"/>
-              <a:t> demo:</a:t>
-            </a:r>
-          </a:p>
-          <a:p>
-            <a:pPr marL="171450" indent="-171450">
-              <a:buFontTx/>
-              <a:buChar char="-"/>
-            </a:pPr>
             <a:endParaRPr lang="nb-NO" dirty="0"/>
           </a:p>
         </p:txBody>
@@ -1131,7 +1109,7 @@
           <a:p>
             <a:fld id="{180377DB-C4B0-49B2-8838-0F01BA83B7C4}" type="slidenum">
               <a:rPr lang="nb-NO" smtClean="0"/>
-              <a:t>20</a:t>
+              <a:t>19</a:t>
             </a:fld>
             <a:endParaRPr lang="nb-NO"/>
           </a:p>
@@ -1140,7 +1118,7 @@
     </p:spTree>
     <p:extLst>
       <p:ext uri="{BB962C8B-B14F-4D97-AF65-F5344CB8AC3E}">
-        <p14:creationId xmlns:p14="http://schemas.microsoft.com/office/powerpoint/2010/main" val="2965951550"/>
+        <p14:creationId xmlns:p14="http://schemas.microsoft.com/office/powerpoint/2010/main" val="320389312"/>
       </p:ext>
     </p:extLst>
   </p:cSld>
@@ -1194,6 +1172,28 @@
           <a:bodyPr/>
           <a:lstStyle/>
           <a:p>
+            <a:pPr marL="171450" indent="-171450">
+              <a:buFontTx/>
+              <a:buChar char="-"/>
+            </a:pPr>
+            <a:r>
+              <a:rPr lang="nb-NO" dirty="0"/>
+              <a:t>Web </a:t>
+            </a:r>
+            <a:r>
+              <a:rPr lang="nb-NO" dirty="0" err="1"/>
+              <a:t>Apps</a:t>
+            </a:r>
+            <a:r>
+              <a:rPr lang="nb-NO" dirty="0"/>
+              <a:t> demo:</a:t>
+            </a:r>
+          </a:p>
+          <a:p>
+            <a:pPr marL="171450" indent="-171450">
+              <a:buFontTx/>
+              <a:buChar char="-"/>
+            </a:pPr>
             <a:endParaRPr lang="nb-NO" dirty="0"/>
           </a:p>
         </p:txBody>
@@ -1215,7 +1215,7 @@
           <a:p>
             <a:fld id="{180377DB-C4B0-49B2-8838-0F01BA83B7C4}" type="slidenum">
               <a:rPr lang="nb-NO" smtClean="0"/>
-              <a:t>22</a:t>
+              <a:t>21</a:t>
             </a:fld>
             <a:endParaRPr lang="nb-NO"/>
           </a:p>
@@ -1224,7 +1224,7 @@
     </p:spTree>
     <p:extLst>
       <p:ext uri="{BB962C8B-B14F-4D97-AF65-F5344CB8AC3E}">
-        <p14:creationId xmlns:p14="http://schemas.microsoft.com/office/powerpoint/2010/main" val="546288370"/>
+        <p14:creationId xmlns:p14="http://schemas.microsoft.com/office/powerpoint/2010/main" val="2965951550"/>
       </p:ext>
     </p:extLst>
   </p:cSld>
@@ -1278,113 +1278,7 @@
           <a:bodyPr/>
           <a:lstStyle/>
           <a:p>
-            <a:r>
-              <a:rPr lang="nb-NO" dirty="0"/>
-              <a:t>Fullt mulig å installere</a:t>
-            </a:r>
-          </a:p>
-          <a:p>
-            <a:r>
-              <a:rPr lang="nb-NO" dirty="0"/>
-              <a:t>Azure SQL Database</a:t>
-            </a:r>
-          </a:p>
-          <a:p>
-            <a:pPr marL="171450" indent="-171450">
-              <a:buFontTx/>
-              <a:buChar char="-"/>
-            </a:pPr>
-            <a:r>
-              <a:rPr lang="nb-NO" dirty="0"/>
-              <a:t>Tjeneste: Alt inkludert  </a:t>
-            </a:r>
-          </a:p>
-          <a:p>
-            <a:pPr marL="171450" indent="-171450">
-              <a:buFontTx/>
-              <a:buChar char="-"/>
-            </a:pPr>
-            <a:r>
-              <a:rPr lang="nb-NO" dirty="0"/>
-              <a:t>Ytelse måles i DTU (Data Transfer Units)</a:t>
-            </a:r>
-          </a:p>
-          <a:p>
-            <a:pPr marL="171450" indent="-171450">
-              <a:buFontTx/>
-              <a:buChar char="-"/>
-            </a:pPr>
-            <a:r>
-              <a:rPr lang="nb-NO" dirty="0"/>
-              <a:t>Mangler noen </a:t>
-            </a:r>
-            <a:r>
-              <a:rPr lang="nb-NO" dirty="0" err="1"/>
-              <a:t>features</a:t>
-            </a:r>
-            <a:r>
-              <a:rPr lang="nb-NO" dirty="0"/>
-              <a:t> fra vanlig.</a:t>
-            </a:r>
-          </a:p>
-          <a:p>
-            <a:pPr marL="171450" indent="-171450">
-              <a:buFontTx/>
-              <a:buChar char="-"/>
-            </a:pPr>
-            <a:r>
-              <a:rPr lang="nb-NO" dirty="0"/>
-              <a:t>Man kan også kjøre opp en vm og </a:t>
-            </a:r>
-            <a:r>
-              <a:rPr lang="nb-NO" dirty="0" err="1"/>
-              <a:t>instllaere</a:t>
-            </a:r>
-            <a:r>
-              <a:rPr lang="nb-NO" dirty="0"/>
-              <a:t> </a:t>
-            </a:r>
-            <a:r>
-              <a:rPr lang="nb-NO" dirty="0" err="1"/>
-              <a:t>sql</a:t>
-            </a:r>
-            <a:r>
-              <a:rPr lang="nb-NO" dirty="0"/>
-              <a:t> server. Men da må man ha egen lisens, og man må.</a:t>
-            </a:r>
-          </a:p>
-          <a:p>
-            <a:pPr marL="171450" indent="-171450">
-              <a:buFontTx/>
-              <a:buChar char="-"/>
-            </a:pPr>
             <a:endParaRPr lang="nb-NO" dirty="0"/>
-          </a:p>
-          <a:p>
-            <a:r>
-              <a:rPr lang="nb-NO" dirty="0"/>
-              <a:t>Cosmos DB:</a:t>
-            </a:r>
-          </a:p>
-          <a:p>
-            <a:pPr marL="171450" indent="-171450">
-              <a:buFontTx/>
-              <a:buChar char="-"/>
-            </a:pPr>
-            <a:r>
-              <a:rPr lang="nb-NO" dirty="0"/>
-              <a:t>Mult</a:t>
-            </a:r>
-          </a:p>
-          <a:p>
-            <a:pPr marL="0" indent="0">
-              <a:buFontTx/>
-              <a:buNone/>
-            </a:pPr>
-            <a:r>
-              <a:rPr lang="nb-NO" dirty="0"/>
-              <a:t>- Satses mye på av </a:t>
-            </a:r>
           </a:p>
         </p:txBody>
       </p:sp>
@@ -1405,7 +1299,7 @@
           <a:p>
             <a:fld id="{180377DB-C4B0-49B2-8838-0F01BA83B7C4}" type="slidenum">
               <a:rPr lang="nb-NO" smtClean="0"/>
-              <a:t>24</a:t>
+              <a:t>22</a:t>
             </a:fld>
             <a:endParaRPr lang="nb-NO"/>
           </a:p>
@@ -1414,7 +1308,7 @@
     </p:spTree>
     <p:extLst>
       <p:ext uri="{BB962C8B-B14F-4D97-AF65-F5344CB8AC3E}">
-        <p14:creationId xmlns:p14="http://schemas.microsoft.com/office/powerpoint/2010/main" val="2766437490"/>
+        <p14:creationId xmlns:p14="http://schemas.microsoft.com/office/powerpoint/2010/main" val="546288370"/>
       </p:ext>
     </p:extLst>
   </p:cSld>
@@ -1469,12 +1363,111 @@
           <a:lstStyle/>
           <a:p>
             <a:r>
+              <a:rPr lang="nb-NO" dirty="0"/>
+              <a:t>Fullt mulig å installere</a:t>
+            </a:r>
+          </a:p>
+          <a:p>
+            <a:r>
+              <a:rPr lang="nb-NO" dirty="0"/>
+              <a:t>Azure SQL Database</a:t>
+            </a:r>
+          </a:p>
+          <a:p>
+            <a:pPr marL="171450" indent="-171450">
+              <a:buFontTx/>
+              <a:buChar char="-"/>
+            </a:pPr>
+            <a:r>
+              <a:rPr lang="nb-NO" dirty="0"/>
+              <a:t>Tjeneste: Alt inkludert  </a:t>
+            </a:r>
+          </a:p>
+          <a:p>
+            <a:pPr marL="171450" indent="-171450">
+              <a:buFontTx/>
+              <a:buChar char="-"/>
+            </a:pPr>
+            <a:r>
+              <a:rPr lang="nb-NO" dirty="0"/>
+              <a:t>Ytelse måles i DTU (Data Transfer Units)</a:t>
+            </a:r>
+          </a:p>
+          <a:p>
+            <a:pPr marL="171450" indent="-171450">
+              <a:buFontTx/>
+              <a:buChar char="-"/>
+            </a:pPr>
+            <a:r>
+              <a:rPr lang="nb-NO" dirty="0"/>
+              <a:t>Mangler noen </a:t>
+            </a:r>
+            <a:r>
               <a:rPr lang="nb-NO" dirty="0" err="1"/>
-              <a:t>Blobs</a:t>
-            </a:r>
-            <a:r>
-              <a:rPr lang="nb-NO" dirty="0"/>
-              <a:t>- virtuell katalogstruktur</a:t>
+              <a:t>features</a:t>
+            </a:r>
+            <a:r>
+              <a:rPr lang="nb-NO" dirty="0"/>
+              <a:t> fra vanlig.</a:t>
+            </a:r>
+          </a:p>
+          <a:p>
+            <a:pPr marL="171450" indent="-171450">
+              <a:buFontTx/>
+              <a:buChar char="-"/>
+            </a:pPr>
+            <a:r>
+              <a:rPr lang="nb-NO" dirty="0"/>
+              <a:t>Man kan også kjøre opp en vm og </a:t>
+            </a:r>
+            <a:r>
+              <a:rPr lang="nb-NO" dirty="0" err="1"/>
+              <a:t>instllaere</a:t>
+            </a:r>
+            <a:r>
+              <a:rPr lang="nb-NO" dirty="0"/>
+              <a:t> </a:t>
+            </a:r>
+            <a:r>
+              <a:rPr lang="nb-NO" dirty="0" err="1"/>
+              <a:t>sql</a:t>
+            </a:r>
+            <a:r>
+              <a:rPr lang="nb-NO" dirty="0"/>
+              <a:t> server. Men da må man ha egen lisens, og man må.</a:t>
+            </a:r>
+          </a:p>
+          <a:p>
+            <a:pPr marL="171450" indent="-171450">
+              <a:buFontTx/>
+              <a:buChar char="-"/>
+            </a:pPr>
+            <a:endParaRPr lang="nb-NO" dirty="0"/>
+          </a:p>
+          <a:p>
+            <a:r>
+              <a:rPr lang="nb-NO" dirty="0"/>
+              <a:t>Cosmos DB:</a:t>
+            </a:r>
+          </a:p>
+          <a:p>
+            <a:pPr marL="171450" indent="-171450">
+              <a:buFontTx/>
+              <a:buChar char="-"/>
+            </a:pPr>
+            <a:r>
+              <a:rPr lang="nb-NO" dirty="0"/>
+              <a:t>Mult</a:t>
+            </a:r>
+          </a:p>
+          <a:p>
+            <a:pPr marL="0" indent="0">
+              <a:buFontTx/>
+              <a:buNone/>
+            </a:pPr>
+            <a:r>
+              <a:rPr lang="nb-NO" dirty="0"/>
+              <a:t>- Satses mye på av </a:t>
             </a:r>
           </a:p>
         </p:txBody>
@@ -1496,7 +1489,7 @@
           <a:p>
             <a:fld id="{180377DB-C4B0-49B2-8838-0F01BA83B7C4}" type="slidenum">
               <a:rPr lang="nb-NO" smtClean="0"/>
-              <a:t>25</a:t>
+              <a:t>24</a:t>
             </a:fld>
             <a:endParaRPr lang="nb-NO"/>
           </a:p>
@@ -1505,7 +1498,7 @@
     </p:spTree>
     <p:extLst>
       <p:ext uri="{BB962C8B-B14F-4D97-AF65-F5344CB8AC3E}">
-        <p14:creationId xmlns:p14="http://schemas.microsoft.com/office/powerpoint/2010/main" val="2113116676"/>
+        <p14:creationId xmlns:p14="http://schemas.microsoft.com/office/powerpoint/2010/main" val="2766437490"/>
       </p:ext>
     </p:extLst>
   </p:cSld>
@@ -1560,6 +1553,97 @@
           <a:lstStyle/>
           <a:p>
             <a:r>
+              <a:rPr lang="nb-NO" dirty="0" err="1"/>
+              <a:t>Blobs</a:t>
+            </a:r>
+            <a:r>
+              <a:rPr lang="nb-NO" dirty="0"/>
+              <a:t>- virtuell katalogstruktur</a:t>
+            </a:r>
+          </a:p>
+        </p:txBody>
+      </p:sp>
+      <p:sp>
+        <p:nvSpPr>
+          <p:cNvPr id="4" name="Slide Number Placeholder 3"/>
+          <p:cNvSpPr>
+            <a:spLocks noGrp="1"/>
+          </p:cNvSpPr>
+          <p:nvPr>
+            <p:ph type="sldNum" sz="quarter" idx="10"/>
+          </p:nvPr>
+        </p:nvSpPr>
+        <p:spPr/>
+        <p:txBody>
+          <a:bodyPr/>
+          <a:lstStyle/>
+          <a:p>
+            <a:fld id="{180377DB-C4B0-49B2-8838-0F01BA83B7C4}" type="slidenum">
+              <a:rPr lang="nb-NO" smtClean="0"/>
+              <a:t>25</a:t>
+            </a:fld>
+            <a:endParaRPr lang="nb-NO"/>
+          </a:p>
+        </p:txBody>
+      </p:sp>
+    </p:spTree>
+    <p:extLst>
+      <p:ext uri="{BB962C8B-B14F-4D97-AF65-F5344CB8AC3E}">
+        <p14:creationId xmlns:p14="http://schemas.microsoft.com/office/powerpoint/2010/main" val="2113116676"/>
+      </p:ext>
+    </p:extLst>
+  </p:cSld>
+  <p:clrMapOvr>
+    <a:masterClrMapping/>
+  </p:clrMapOvr>
+</p:notes>
+</file>
+
+<file path=ppt/notesSlides/notesSlide18.xml><?xml version="1.0" encoding="utf-8"?>
+<p:notes xmlns:a="http://schemas.openxmlformats.org/drawingml/2006/main" xmlns:r="http://schemas.openxmlformats.org/officeDocument/2006/relationships" xmlns:p="http://schemas.openxmlformats.org/presentationml/2006/main">
+  <p:cSld>
+    <p:spTree>
+      <p:nvGrpSpPr>
+        <p:cNvPr id="1" name=""/>
+        <p:cNvGrpSpPr/>
+        <p:nvPr/>
+      </p:nvGrpSpPr>
+      <p:grpSpPr>
+        <a:xfrm>
+          <a:off x="0" y="0"/>
+          <a:ext cx="0" cy="0"/>
+          <a:chOff x="0" y="0"/>
+          <a:chExt cx="0" cy="0"/>
+        </a:xfrm>
+      </p:grpSpPr>
+      <p:sp>
+        <p:nvSpPr>
+          <p:cNvPr id="2" name="Slide Image Placeholder 1"/>
+          <p:cNvSpPr>
+            <a:spLocks noGrp="1" noRot="1" noChangeAspect="1"/>
+          </p:cNvSpPr>
+          <p:nvPr>
+            <p:ph type="sldImg"/>
+          </p:nvPr>
+        </p:nvSpPr>
+        <p:spPr/>
+      </p:sp>
+      <p:sp>
+        <p:nvSpPr>
+          <p:cNvPr id="3" name="Notes Placeholder 2"/>
+          <p:cNvSpPr>
+            <a:spLocks noGrp="1"/>
+          </p:cNvSpPr>
+          <p:nvPr>
+            <p:ph type="body" idx="1"/>
+          </p:nvPr>
+        </p:nvSpPr>
+        <p:spPr/>
+        <p:txBody>
+          <a:bodyPr/>
+          <a:lstStyle/>
+          <a:p>
+            <a:r>
               <a:rPr lang="nb-NO" dirty="0"/>
               <a:t>SAS-tokens: Key-</a:t>
             </a:r>
@@ -1618,7 +1702,7 @@
 </p:notes>
 </file>
 
-<file path=ppt/notesSlides/notesSlide18.xml><?xml version="1.0" encoding="utf-8"?>
+<file path=ppt/notesSlides/notesSlide19.xml><?xml version="1.0" encoding="utf-8"?>
 <p:notes xmlns:a="http://schemas.openxmlformats.org/drawingml/2006/main" xmlns:r="http://schemas.openxmlformats.org/officeDocument/2006/relationships" xmlns:p="http://schemas.openxmlformats.org/presentationml/2006/main">
   <p:cSld>
     <p:spTree>
@@ -1926,73 +2010,69 @@
           <a:bodyPr/>
           <a:lstStyle/>
           <a:p>
-            <a:pPr marL="171450" marR="0" lvl="0" indent="-171450" algn="l" defTabSz="914400" rtl="0" eaLnBrk="1" fontAlgn="auto" latinLnBrk="0" hangingPunct="1">
-              <a:lnSpc>
-                <a:spcPct val="100000"/>
-              </a:lnSpc>
-              <a:spcBef>
-                <a:spcPts val="0"/>
-              </a:spcBef>
-              <a:spcAft>
-                <a:spcPts val="0"/>
-              </a:spcAft>
-              <a:buClrTx/>
-              <a:buSzTx/>
+            <a:pPr marL="171450" indent="-171450">
               <a:buFontTx/>
               <a:buChar char="-"/>
-              <a:tabLst/>
-              <a:defRPr/>
             </a:pPr>
             <a:r>
               <a:rPr lang="nb-NO" dirty="0"/>
-              <a:t>West Europe (Nederland) eller North Europe (Irland) mest aktuelle for oss, snart Norge.</a:t>
-            </a:r>
-          </a:p>
-          <a:p>
-            <a:pPr marL="171450" marR="0" lvl="0" indent="-171450" algn="l" defTabSz="914400" rtl="0" eaLnBrk="1" fontAlgn="auto" latinLnBrk="0" hangingPunct="1">
-              <a:lnSpc>
-                <a:spcPct val="100000"/>
-              </a:lnSpc>
-              <a:spcBef>
-                <a:spcPts val="0"/>
-              </a:spcBef>
-              <a:spcAft>
-                <a:spcPts val="0"/>
-              </a:spcAft>
-              <a:buClrTx/>
-              <a:buSzTx/>
+              <a:t>Avhenger hvor mye </a:t>
+            </a:r>
+          </a:p>
+          <a:p>
+            <a:pPr marL="171450" indent="-171450">
               <a:buFontTx/>
               <a:buChar char="-"/>
-              <a:tabLst/>
-              <a:defRPr/>
             </a:pPr>
             <a:endParaRPr lang="nb-NO" dirty="0"/>
           </a:p>
           <a:p>
-            <a:pPr marL="171450" marR="0" lvl="0" indent="-171450" algn="l" defTabSz="914400" rtl="0" eaLnBrk="1" fontAlgn="auto" latinLnBrk="0" hangingPunct="1">
-              <a:lnSpc>
-                <a:spcPct val="100000"/>
-              </a:lnSpc>
-              <a:spcBef>
-                <a:spcPts val="0"/>
-              </a:spcBef>
-              <a:spcAft>
-                <a:spcPts val="0"/>
-              </a:spcAft>
-              <a:buClrTx/>
-              <a:buSzTx/>
+            <a:pPr marL="171450" indent="-171450">
               <a:buFontTx/>
               <a:buChar char="-"/>
-              <a:tabLst/>
-              <a:defRPr/>
             </a:pPr>
             <a:r>
               <a:rPr lang="nb-NO" dirty="0"/>
-              <a:t>Speedtest: </a:t>
-            </a:r>
-          </a:p>
-          <a:p>
-            <a:endParaRPr lang="nb-NO" dirty="0"/>
+              <a:t>Eksempler:</a:t>
+            </a:r>
+          </a:p>
+          <a:p>
+            <a:pPr marL="171450" indent="-171450">
+              <a:buFontTx/>
+              <a:buChar char="-"/>
+            </a:pPr>
+            <a:r>
+              <a:rPr lang="nb-NO" dirty="0"/>
+              <a:t>SAAS: Office 365</a:t>
+            </a:r>
+          </a:p>
+          <a:p>
+            <a:pPr marL="171450" indent="-171450">
+              <a:buFontTx/>
+              <a:buChar char="-"/>
+            </a:pPr>
+            <a:r>
+              <a:rPr lang="nb-NO" dirty="0"/>
+              <a:t>PAAS: Azure Web Sites</a:t>
+            </a:r>
+          </a:p>
+          <a:p>
+            <a:pPr marL="171450" indent="-171450">
+              <a:buFontTx/>
+              <a:buChar char="-"/>
+            </a:pPr>
+            <a:r>
+              <a:rPr lang="nb-NO" dirty="0"/>
+              <a:t>IAAS: </a:t>
+            </a:r>
+            <a:r>
+              <a:rPr lang="nb-NO" dirty="0" err="1"/>
+              <a:t>VM’er</a:t>
+            </a:r>
+            <a:r>
+              <a:rPr lang="nb-NO" dirty="0"/>
+              <a:t>.</a:t>
+            </a:r>
           </a:p>
         </p:txBody>
       </p:sp>
@@ -2022,7 +2102,7 @@
     </p:spTree>
     <p:extLst>
       <p:ext uri="{BB962C8B-B14F-4D97-AF65-F5344CB8AC3E}">
-        <p14:creationId xmlns:p14="http://schemas.microsoft.com/office/powerpoint/2010/main" val="2700718377"/>
+        <p14:creationId xmlns:p14="http://schemas.microsoft.com/office/powerpoint/2010/main" val="1832301372"/>
       </p:ext>
     </p:extLst>
   </p:cSld>
@@ -2076,49 +2156,74 @@
           <a:bodyPr/>
           <a:lstStyle/>
           <a:p>
+            <a:pPr marL="171450" marR="0" lvl="0" indent="-171450" algn="l" defTabSz="914400" rtl="0" eaLnBrk="1" fontAlgn="auto" latinLnBrk="0" hangingPunct="1">
+              <a:lnSpc>
+                <a:spcPct val="100000"/>
+              </a:lnSpc>
+              <a:spcBef>
+                <a:spcPts val="0"/>
+              </a:spcBef>
+              <a:spcAft>
+                <a:spcPts val="0"/>
+              </a:spcAft>
+              <a:buClrTx/>
+              <a:buSzTx/>
+              <a:buFontTx/>
+              <a:buChar char="-"/>
+              <a:tabLst/>
+              <a:defRPr/>
+            </a:pPr>
+            <a:r>
+              <a:rPr lang="nb-NO" dirty="0"/>
+              <a:t>West Europe (Nederland) eller North Europe (Irland) mest aktuelle for oss, snart Norge.</a:t>
+            </a:r>
+          </a:p>
+          <a:p>
+            <a:pPr marL="171450" marR="0" lvl="0" indent="-171450" algn="l" defTabSz="914400" rtl="0" eaLnBrk="1" fontAlgn="auto" latinLnBrk="0" hangingPunct="1">
+              <a:lnSpc>
+                <a:spcPct val="100000"/>
+              </a:lnSpc>
+              <a:spcBef>
+                <a:spcPts val="0"/>
+              </a:spcBef>
+              <a:spcAft>
+                <a:spcPts val="0"/>
+              </a:spcAft>
+              <a:buClrTx/>
+              <a:buSzTx/>
+              <a:buFontTx/>
+              <a:buChar char="-"/>
+              <a:tabLst/>
+              <a:defRPr/>
+            </a:pPr>
             <a:endParaRPr lang="nb-NO" dirty="0"/>
           </a:p>
           <a:p>
+            <a:pPr marL="171450" marR="0" lvl="0" indent="-171450" algn="l" defTabSz="914400" rtl="0" eaLnBrk="1" fontAlgn="auto" latinLnBrk="0" hangingPunct="1">
+              <a:lnSpc>
+                <a:spcPct val="100000"/>
+              </a:lnSpc>
+              <a:spcBef>
+                <a:spcPts val="0"/>
+              </a:spcBef>
+              <a:spcAft>
+                <a:spcPts val="0"/>
+              </a:spcAft>
+              <a:buClrTx/>
+              <a:buSzTx/>
+              <a:buFontTx/>
+              <a:buChar char="-"/>
+              <a:tabLst/>
+              <a:defRPr/>
+            </a:pPr>
+            <a:r>
+              <a:rPr lang="nb-NO" dirty="0"/>
+              <a:t>Speedtest: </a:t>
+            </a:r>
+          </a:p>
+          <a:p>
             <a:endParaRPr lang="nb-NO" dirty="0"/>
           </a:p>
-          <a:p>
-            <a:endParaRPr lang="nb-NO" dirty="0"/>
-          </a:p>
-          <a:p>
-            <a:r>
-              <a:rPr lang="nb-NO" dirty="0"/>
-              <a:t>RBAC</a:t>
-            </a:r>
-          </a:p>
-          <a:p>
-            <a:r>
-              <a:rPr lang="nb-NO" dirty="0" err="1"/>
-              <a:t>Owner</a:t>
-            </a:r>
-            <a:r>
-              <a:rPr lang="nb-NO" dirty="0"/>
-              <a:t> – Alle rettigheter</a:t>
-            </a:r>
-          </a:p>
-          <a:p>
-            <a:r>
-              <a:rPr lang="nb-NO" dirty="0" err="1"/>
-              <a:t>Contributer</a:t>
-            </a:r>
-            <a:r>
-              <a:rPr lang="nb-NO" dirty="0"/>
-              <a:t> – Alle rettigheter bortsett fra å </a:t>
-            </a:r>
-          </a:p>
-          <a:p>
-            <a:endParaRPr lang="nb-NO" dirty="0"/>
-          </a:p>
-          <a:p>
-            <a:r>
-              <a:rPr lang="nb-NO" dirty="0"/>
-              <a:t>- Blir arvet.</a:t>
-            </a:r>
-          </a:p>
         </p:txBody>
       </p:sp>
       <p:sp>
@@ -2128,7 +2233,7 @@
             <a:spLocks noGrp="1"/>
           </p:cNvSpPr>
           <p:nvPr>
-            <p:ph type="sldNum" sz="quarter" idx="5"/>
+            <p:ph type="sldNum" sz="quarter" idx="10"/>
           </p:nvPr>
         </p:nvSpPr>
         <p:spPr/>
@@ -2147,7 +2252,7 @@
     </p:spTree>
     <p:extLst>
       <p:ext uri="{BB962C8B-B14F-4D97-AF65-F5344CB8AC3E}">
-        <p14:creationId xmlns:p14="http://schemas.microsoft.com/office/powerpoint/2010/main" val="390691634"/>
+        <p14:creationId xmlns:p14="http://schemas.microsoft.com/office/powerpoint/2010/main" val="2700718377"/>
       </p:ext>
     </p:extLst>
   </p:cSld>
@@ -2201,68 +2306,47 @@
           <a:bodyPr/>
           <a:lstStyle/>
           <a:p>
-            <a:pPr marL="171450" indent="-171450">
-              <a:buFontTx/>
-              <a:buChar char="-"/>
-            </a:pPr>
-            <a:r>
-              <a:rPr lang="nb-NO" dirty="0"/>
-              <a:t>Avhenger hvor mye </a:t>
-            </a:r>
-          </a:p>
-          <a:p>
-            <a:pPr marL="171450" indent="-171450">
-              <a:buFontTx/>
-              <a:buChar char="-"/>
-            </a:pPr>
             <a:endParaRPr lang="nb-NO" dirty="0"/>
           </a:p>
           <a:p>
-            <a:pPr marL="171450" indent="-171450">
-              <a:buFontTx/>
-              <a:buChar char="-"/>
-            </a:pPr>
-            <a:r>
-              <a:rPr lang="nb-NO" dirty="0"/>
-              <a:t>Eksempler:</a:t>
-            </a:r>
-          </a:p>
-          <a:p>
-            <a:pPr marL="171450" indent="-171450">
-              <a:buFontTx/>
-              <a:buChar char="-"/>
-            </a:pPr>
-            <a:r>
-              <a:rPr lang="nb-NO" dirty="0"/>
-              <a:t>SAAS: Office 365</a:t>
-            </a:r>
-          </a:p>
-          <a:p>
-            <a:pPr marL="171450" indent="-171450">
-              <a:buFontTx/>
-              <a:buChar char="-"/>
-            </a:pPr>
-            <a:r>
-              <a:rPr lang="nb-NO" dirty="0"/>
-              <a:t>PAAS: Azure Web Sites</a:t>
-            </a:r>
-          </a:p>
-          <a:p>
-            <a:pPr marL="171450" indent="-171450">
-              <a:buFontTx/>
-              <a:buChar char="-"/>
-            </a:pPr>
-            <a:r>
-              <a:rPr lang="nb-NO" dirty="0"/>
-              <a:t>IAAS: </a:t>
-            </a:r>
+            <a:endParaRPr lang="nb-NO" dirty="0"/>
+          </a:p>
+          <a:p>
+            <a:endParaRPr lang="nb-NO" dirty="0"/>
+          </a:p>
+          <a:p>
+            <a:r>
+              <a:rPr lang="nb-NO" dirty="0"/>
+              <a:t>RBAC</a:t>
+            </a:r>
+          </a:p>
+          <a:p>
             <a:r>
               <a:rPr lang="nb-NO" dirty="0" err="1"/>
-              <a:t>VM’er</a:t>
-            </a:r>
-            <a:r>
-              <a:rPr lang="nb-NO" dirty="0"/>
-              <a:t>.</a:t>
+              <a:t>Owner</a:t>
+            </a:r>
+            <a:r>
+              <a:rPr lang="nb-NO" dirty="0"/>
+              <a:t> – Alle rettigheter</a:t>
+            </a:r>
+          </a:p>
+          <a:p>
+            <a:r>
+              <a:rPr lang="nb-NO" dirty="0" err="1"/>
+              <a:t>Contributer</a:t>
+            </a:r>
+            <a:r>
+              <a:rPr lang="nb-NO" dirty="0"/>
+              <a:t> – Alle rettigheter bortsett fra å </a:t>
+            </a:r>
+          </a:p>
+          <a:p>
+            <a:endParaRPr lang="nb-NO" dirty="0"/>
+          </a:p>
+          <a:p>
+            <a:r>
+              <a:rPr lang="nb-NO" dirty="0"/>
+              <a:t>- Blir arvet.</a:t>
             </a:r>
           </a:p>
         </p:txBody>
@@ -2274,7 +2358,7 @@
             <a:spLocks noGrp="1"/>
           </p:cNvSpPr>
           <p:nvPr>
-            <p:ph type="sldNum" sz="quarter" idx="10"/>
+            <p:ph type="sldNum" sz="quarter" idx="5"/>
           </p:nvPr>
         </p:nvSpPr>
         <p:spPr/>
@@ -2293,7 +2377,7 @@
     </p:spTree>
     <p:extLst>
       <p:ext uri="{BB962C8B-B14F-4D97-AF65-F5344CB8AC3E}">
-        <p14:creationId xmlns:p14="http://schemas.microsoft.com/office/powerpoint/2010/main" val="1832301372"/>
+        <p14:creationId xmlns:p14="http://schemas.microsoft.com/office/powerpoint/2010/main" val="390691634"/>
       </p:ext>
     </p:extLst>
   </p:cSld>
@@ -11918,45 +12002,19 @@
             </a:r>
           </a:p>
           <a:p>
+            <a:endParaRPr lang="nb-NO" dirty="0"/>
+          </a:p>
+          <a:p>
+            <a:r>
+              <a:rPr lang="nb-NO" dirty="0"/>
+              <a:t>Inkludert i prisen:</a:t>
+            </a:r>
+          </a:p>
+          <a:p>
             <a:pPr lvl="1"/>
             <a:r>
-              <a:rPr lang="nb-NO" dirty="0" err="1"/>
-              <a:t>Compute</a:t>
-            </a:r>
-            <a:endParaRPr lang="nb-NO" dirty="0"/>
-          </a:p>
-          <a:p>
-            <a:pPr lvl="1"/>
-            <a:r>
-              <a:rPr lang="nb-NO" dirty="0"/>
-              <a:t>Lagring</a:t>
-            </a:r>
-          </a:p>
-          <a:p>
-            <a:pPr lvl="1"/>
-            <a:r>
-              <a:rPr lang="nb-NO" dirty="0"/>
-              <a:t>Transport</a:t>
-            </a:r>
-          </a:p>
-          <a:p>
-            <a:pPr lvl="1"/>
-            <a:r>
-              <a:rPr lang="nb-NO" dirty="0"/>
-              <a:t>Tjenester</a:t>
-            </a:r>
-          </a:p>
-          <a:p>
-            <a:r>
-              <a:rPr lang="nb-NO" dirty="0"/>
-              <a:t>Inkludert i prisen:</a:t>
-            </a:r>
-          </a:p>
-          <a:p>
-            <a:pPr lvl="1"/>
-            <a:r>
-              <a:rPr lang="nb-NO" dirty="0"/>
-              <a:t>Hardware-kost</a:t>
+              <a:rPr lang="nb-NO" dirty="0"/>
+              <a:t>Hardware</a:t>
             </a:r>
           </a:p>
           <a:p>
@@ -11983,6 +12041,10 @@
               <a:rPr lang="nb-NO" dirty="0"/>
               <a:t>Strøm</a:t>
             </a:r>
+          </a:p>
+          <a:p>
+            <a:pPr lvl="1"/>
+            <a:endParaRPr lang="nb-NO" dirty="0"/>
           </a:p>
           <a:p>
             <a:r>
@@ -12025,7 +12087,7 @@
           <a:p>
             <a:r>
               <a:rPr lang="nb-NO" dirty="0"/>
-              <a:t>Kostnader</a:t>
+              <a:t>Kostnader – Hva betaler man for</a:t>
             </a:r>
           </a:p>
         </p:txBody>
@@ -12118,7 +12180,7 @@
           <a:p>
             <a:r>
               <a:rPr lang="nb-NO" dirty="0"/>
-              <a:t>Azure </a:t>
+              <a:t>Azure.. </a:t>
             </a:r>
             <a:r>
               <a:rPr lang="nb-NO" dirty="0" err="1"/>
@@ -12241,7 +12303,7 @@
             </a:r>
             <a:r>
               <a:rPr lang="nb-NO" dirty="0"/>
-              <a:t> SLA: Service1 + Service2 =  </a:t>
+              <a:t> SLA: Service1 SLA + Service2 SLA =  </a:t>
             </a:r>
           </a:p>
         </p:txBody>
@@ -12694,10 +12756,8 @@
           <a:p>
             <a:r>
               <a:rPr lang="nb-NO" dirty="0"/>
-              <a:t>Skalering</a:t>
-            </a:r>
-          </a:p>
-          <a:p>
+              <a:t>Skalering / </a:t>
+            </a:r>
             <a:r>
               <a:rPr lang="nb-NO" dirty="0" err="1"/>
               <a:t>Autoskalering</a:t>
@@ -13769,14 +13829,14 @@
           </a:ln>
           <a:extLst>
             <a:ext uri="{909E8E84-426E-40dd-AFC4-6F175D3DCCD1}">
-              <a14:hiddenFill xmlns:lc="http://schemas.openxmlformats.org/drawingml/2006/lockedCanvas" xmlns:a14="http://schemas.microsoft.com/office/drawing/2010/main" xmlns="">
+              <a14:hiddenFill xmlns="" xmlns:a14="http://schemas.microsoft.com/office/drawing/2010/main" xmlns:lc="http://schemas.openxmlformats.org/drawingml/2006/lockedCanvas">
                 <a:solidFill>
                   <a:srgbClr val="FFFFFF"/>
                 </a:solidFill>
               </a14:hiddenFill>
             </a:ext>
             <a:ext uri="{91240B29-F687-4f45-9708-019B960494DF}">
-              <a14:hiddenLine xmlns:lc="http://schemas.openxmlformats.org/drawingml/2006/lockedCanvas" xmlns:a14="http://schemas.microsoft.com/office/drawing/2010/main" xmlns="" w="9525">
+              <a14:hiddenLine xmlns="" xmlns:a14="http://schemas.microsoft.com/office/drawing/2010/main" xmlns:lc="http://schemas.openxmlformats.org/drawingml/2006/lockedCanvas" w="9525">
                 <a:solidFill>
                   <a:srgbClr val="000000"/>
                 </a:solidFill>
@@ -13965,14 +14025,14 @@
           </a:ln>
           <a:extLst>
             <a:ext uri="{909E8E84-426E-40dd-AFC4-6F175D3DCCD1}">
-              <a14:hiddenFill xmlns:lc="http://schemas.openxmlformats.org/drawingml/2006/lockedCanvas" xmlns:a14="http://schemas.microsoft.com/office/drawing/2010/main" xmlns="">
+              <a14:hiddenFill xmlns="" xmlns:a14="http://schemas.microsoft.com/office/drawing/2010/main" xmlns:lc="http://schemas.openxmlformats.org/drawingml/2006/lockedCanvas">
                 <a:solidFill>
                   <a:srgbClr val="FFFFFF"/>
                 </a:solidFill>
               </a14:hiddenFill>
             </a:ext>
             <a:ext uri="{91240B29-F687-4f45-9708-019B960494DF}">
-              <a14:hiddenLine xmlns:lc="http://schemas.openxmlformats.org/drawingml/2006/lockedCanvas" xmlns:a14="http://schemas.microsoft.com/office/drawing/2010/main" xmlns="" w="9525">
+              <a14:hiddenLine xmlns="" xmlns:a14="http://schemas.microsoft.com/office/drawing/2010/main" xmlns:lc="http://schemas.openxmlformats.org/drawingml/2006/lockedCanvas" w="9525">
                 <a:solidFill>
                   <a:srgbClr val="000000"/>
                 </a:solidFill>
@@ -14433,14 +14493,14 @@
           </a:ln>
           <a:extLst>
             <a:ext uri="{909E8E84-426E-40dd-AFC4-6F175D3DCCD1}">
-              <a14:hiddenFill xmlns:lc="http://schemas.openxmlformats.org/drawingml/2006/lockedCanvas" xmlns:a14="http://schemas.microsoft.com/office/drawing/2010/main" xmlns="">
+              <a14:hiddenFill xmlns="" xmlns:a14="http://schemas.microsoft.com/office/drawing/2010/main" xmlns:lc="http://schemas.openxmlformats.org/drawingml/2006/lockedCanvas">
                 <a:solidFill>
                   <a:srgbClr val="FFFFFF"/>
                 </a:solidFill>
               </a14:hiddenFill>
             </a:ext>
             <a:ext uri="{91240B29-F687-4f45-9708-019B960494DF}">
-              <a14:hiddenLine xmlns:lc="http://schemas.openxmlformats.org/drawingml/2006/lockedCanvas" xmlns:a14="http://schemas.microsoft.com/office/drawing/2010/main" xmlns="" w="9525">
+              <a14:hiddenLine xmlns="" xmlns:a14="http://schemas.microsoft.com/office/drawing/2010/main" xmlns:lc="http://schemas.openxmlformats.org/drawingml/2006/lockedCanvas" w="9525">
                 <a:solidFill>
                   <a:srgbClr val="000000"/>
                 </a:solidFill>
@@ -15146,14 +15206,14 @@
           </a:ln>
           <a:extLst>
             <a:ext uri="{909E8E84-426E-40dd-AFC4-6F175D3DCCD1}">
-              <a14:hiddenFill xmlns:lc="http://schemas.openxmlformats.org/drawingml/2006/lockedCanvas" xmlns:a14="http://schemas.microsoft.com/office/drawing/2010/main" xmlns="">
+              <a14:hiddenFill xmlns="" xmlns:a14="http://schemas.microsoft.com/office/drawing/2010/main" xmlns:lc="http://schemas.openxmlformats.org/drawingml/2006/lockedCanvas">
                 <a:solidFill>
                   <a:srgbClr val="FFFFFF"/>
                 </a:solidFill>
               </a14:hiddenFill>
             </a:ext>
             <a:ext uri="{91240B29-F687-4f45-9708-019B960494DF}">
-              <a14:hiddenLine xmlns:lc="http://schemas.openxmlformats.org/drawingml/2006/lockedCanvas" xmlns:a14="http://schemas.microsoft.com/office/drawing/2010/main" xmlns="" w="9525">
+              <a14:hiddenLine xmlns="" xmlns:a14="http://schemas.microsoft.com/office/drawing/2010/main" xmlns:lc="http://schemas.openxmlformats.org/drawingml/2006/lockedCanvas" w="9525">
                 <a:solidFill>
                   <a:srgbClr val="000000"/>
                 </a:solidFill>
@@ -15206,14 +15266,14 @@
           </a:ln>
           <a:extLst>
             <a:ext uri="{909E8E84-426E-40dd-AFC4-6F175D3DCCD1}">
-              <a14:hiddenFill xmlns:lc="http://schemas.openxmlformats.org/drawingml/2006/lockedCanvas" xmlns:a14="http://schemas.microsoft.com/office/drawing/2010/main" xmlns="">
+              <a14:hiddenFill xmlns="" xmlns:a14="http://schemas.microsoft.com/office/drawing/2010/main" xmlns:lc="http://schemas.openxmlformats.org/drawingml/2006/lockedCanvas">
                 <a:solidFill>
                   <a:srgbClr val="FFFFFF"/>
                 </a:solidFill>
               </a14:hiddenFill>
             </a:ext>
             <a:ext uri="{91240B29-F687-4f45-9708-019B960494DF}">
-              <a14:hiddenLine xmlns:lc="http://schemas.openxmlformats.org/drawingml/2006/lockedCanvas" xmlns:a14="http://schemas.microsoft.com/office/drawing/2010/main" xmlns="" w="9525">
+              <a14:hiddenLine xmlns="" xmlns:a14="http://schemas.microsoft.com/office/drawing/2010/main" xmlns:lc="http://schemas.openxmlformats.org/drawingml/2006/lockedCanvas" w="9525">
                 <a:solidFill>
                   <a:srgbClr val="000000"/>
                 </a:solidFill>
@@ -15651,94 +15711,6 @@
 </file>
 
 <file path=ppt/slides/slide20.xml><?xml version="1.0" encoding="utf-8"?>
-<p:sld xmlns:a="http://schemas.openxmlformats.org/drawingml/2006/main" xmlns:r="http://schemas.openxmlformats.org/officeDocument/2006/relationships" xmlns:p="http://schemas.openxmlformats.org/presentationml/2006/main">
-  <p:cSld>
-    <p:spTree>
-      <p:nvGrpSpPr>
-        <p:cNvPr id="1" name=""/>
-        <p:cNvGrpSpPr/>
-        <p:nvPr/>
-      </p:nvGrpSpPr>
-      <p:grpSpPr>
-        <a:xfrm>
-          <a:off x="0" y="0"/>
-          <a:ext cx="0" cy="0"/>
-          <a:chOff x="0" y="0"/>
-          <a:chExt cx="0" cy="0"/>
-        </a:xfrm>
-      </p:grpSpPr>
-      <p:sp>
-        <p:nvSpPr>
-          <p:cNvPr id="2" name="Content Placeholder 1">
-            <a:extLst>
-              <a:ext uri="{FF2B5EF4-FFF2-40B4-BE49-F238E27FC236}">
-                <a16:creationId xmlns:a16="http://schemas.microsoft.com/office/drawing/2014/main" id="{DDB7E498-3C4D-40F4-9886-096A6156A712}"/>
-              </a:ext>
-            </a:extLst>
-          </p:cNvPr>
-          <p:cNvSpPr>
-            <a:spLocks noGrp="1"/>
-          </p:cNvSpPr>
-          <p:nvPr>
-            <p:ph idx="1"/>
-          </p:nvPr>
-        </p:nvSpPr>
-        <p:spPr/>
-        <p:txBody>
-          <a:bodyPr/>
-          <a:lstStyle/>
-          <a:p>
-            <a:pPr lvl="1"/>
-            <a:endParaRPr lang="nb-NO" dirty="0"/>
-          </a:p>
-        </p:txBody>
-      </p:sp>
-      <p:sp>
-        <p:nvSpPr>
-          <p:cNvPr id="3" name="Title 2">
-            <a:extLst>
-              <a:ext uri="{FF2B5EF4-FFF2-40B4-BE49-F238E27FC236}">
-                <a16:creationId xmlns:a16="http://schemas.microsoft.com/office/drawing/2014/main" id="{FF17F895-AE5B-489F-851C-DF70FA11E094}"/>
-              </a:ext>
-            </a:extLst>
-          </p:cNvPr>
-          <p:cNvSpPr>
-            <a:spLocks noGrp="1"/>
-          </p:cNvSpPr>
-          <p:nvPr>
-            <p:ph type="title"/>
-          </p:nvPr>
-        </p:nvSpPr>
-        <p:spPr/>
-        <p:txBody>
-          <a:bodyPr/>
-          <a:lstStyle/>
-          <a:p>
-            <a:r>
-              <a:rPr lang="nb-NO" dirty="0" err="1"/>
-              <a:t>App</a:t>
-            </a:r>
-            <a:r>
-              <a:rPr lang="nb-NO" dirty="0"/>
-              <a:t> Service Plan - Demo</a:t>
-            </a:r>
-          </a:p>
-        </p:txBody>
-      </p:sp>
-    </p:spTree>
-    <p:extLst>
-      <p:ext uri="{BB962C8B-B14F-4D97-AF65-F5344CB8AC3E}">
-        <p14:creationId xmlns:p14="http://schemas.microsoft.com/office/powerpoint/2010/main" val="2537136117"/>
-      </p:ext>
-    </p:extLst>
-  </p:cSld>
-  <p:clrMapOvr>
-    <a:masterClrMapping/>
-  </p:clrMapOvr>
-</p:sld>
-</file>
-
-<file path=ppt/slides/slide21.xml><?xml version="1.0" encoding="utf-8"?>
 <p:sld xmlns:a="http://schemas.openxmlformats.org/drawingml/2006/main" xmlns:r="http://schemas.openxmlformats.org/officeDocument/2006/relationships" xmlns:p="http://schemas.openxmlformats.org/presentationml/2006/main">
   <p:cSld>
     <p:spTree>
@@ -15922,6 +15894,94 @@
 </p:sld>
 </file>
 
+<file path=ppt/slides/slide21.xml><?xml version="1.0" encoding="utf-8"?>
+<p:sld xmlns:a="http://schemas.openxmlformats.org/drawingml/2006/main" xmlns:r="http://schemas.openxmlformats.org/officeDocument/2006/relationships" xmlns:p="http://schemas.openxmlformats.org/presentationml/2006/main">
+  <p:cSld>
+    <p:spTree>
+      <p:nvGrpSpPr>
+        <p:cNvPr id="1" name=""/>
+        <p:cNvGrpSpPr/>
+        <p:nvPr/>
+      </p:nvGrpSpPr>
+      <p:grpSpPr>
+        <a:xfrm>
+          <a:off x="0" y="0"/>
+          <a:ext cx="0" cy="0"/>
+          <a:chOff x="0" y="0"/>
+          <a:chExt cx="0" cy="0"/>
+        </a:xfrm>
+      </p:grpSpPr>
+      <p:sp>
+        <p:nvSpPr>
+          <p:cNvPr id="2" name="Content Placeholder 1">
+            <a:extLst>
+              <a:ext uri="{FF2B5EF4-FFF2-40B4-BE49-F238E27FC236}">
+                <a16:creationId xmlns:a16="http://schemas.microsoft.com/office/drawing/2014/main" id="{DDB7E498-3C4D-40F4-9886-096A6156A712}"/>
+              </a:ext>
+            </a:extLst>
+          </p:cNvPr>
+          <p:cNvSpPr>
+            <a:spLocks noGrp="1"/>
+          </p:cNvSpPr>
+          <p:nvPr>
+            <p:ph idx="1"/>
+          </p:nvPr>
+        </p:nvSpPr>
+        <p:spPr/>
+        <p:txBody>
+          <a:bodyPr/>
+          <a:lstStyle/>
+          <a:p>
+            <a:pPr lvl="1"/>
+            <a:endParaRPr lang="nb-NO" dirty="0"/>
+          </a:p>
+        </p:txBody>
+      </p:sp>
+      <p:sp>
+        <p:nvSpPr>
+          <p:cNvPr id="3" name="Title 2">
+            <a:extLst>
+              <a:ext uri="{FF2B5EF4-FFF2-40B4-BE49-F238E27FC236}">
+                <a16:creationId xmlns:a16="http://schemas.microsoft.com/office/drawing/2014/main" id="{FF17F895-AE5B-489F-851C-DF70FA11E094}"/>
+              </a:ext>
+            </a:extLst>
+          </p:cNvPr>
+          <p:cNvSpPr>
+            <a:spLocks noGrp="1"/>
+          </p:cNvSpPr>
+          <p:nvPr>
+            <p:ph type="title"/>
+          </p:nvPr>
+        </p:nvSpPr>
+        <p:spPr/>
+        <p:txBody>
+          <a:bodyPr/>
+          <a:lstStyle/>
+          <a:p>
+            <a:r>
+              <a:rPr lang="nb-NO" dirty="0" err="1"/>
+              <a:t>App</a:t>
+            </a:r>
+            <a:r>
+              <a:rPr lang="nb-NO" dirty="0"/>
+              <a:t> Service Plan - Demo</a:t>
+            </a:r>
+          </a:p>
+        </p:txBody>
+      </p:sp>
+    </p:spTree>
+    <p:extLst>
+      <p:ext uri="{BB962C8B-B14F-4D97-AF65-F5344CB8AC3E}">
+        <p14:creationId xmlns:p14="http://schemas.microsoft.com/office/powerpoint/2010/main" val="2537136117"/>
+      </p:ext>
+    </p:extLst>
+  </p:cSld>
+  <p:clrMapOvr>
+    <a:masterClrMapping/>
+  </p:clrMapOvr>
+</p:sld>
+</file>
+
 <file path=ppt/slides/slide22.xml><?xml version="1.0" encoding="utf-8"?>
 <p:sld xmlns:a="http://schemas.openxmlformats.org/drawingml/2006/main" xmlns:r="http://schemas.openxmlformats.org/officeDocument/2006/relationships" xmlns:p="http://schemas.openxmlformats.org/presentationml/2006/main">
   <p:cSld>
@@ -16185,35 +16245,50 @@
             <a:pPr lvl="1"/>
             <a:r>
               <a:rPr lang="nb-NO" dirty="0"/>
-              <a:t>SQL Server (</a:t>
+              <a:t>SQL Server som tjeneste i skyen (*)</a:t>
+            </a:r>
+          </a:p>
+          <a:p>
+            <a:r>
+              <a:rPr lang="nb-NO" dirty="0"/>
+              <a:t>Cosmos DB</a:t>
+            </a:r>
+          </a:p>
+          <a:p>
+            <a:pPr lvl="1"/>
+            <a:r>
+              <a:rPr lang="nb-NO" dirty="0"/>
+              <a:t>No-SQL-database</a:t>
+            </a:r>
+          </a:p>
+          <a:p>
+            <a:pPr lvl="1"/>
+            <a:r>
+              <a:rPr lang="nb-NO" dirty="0"/>
+              <a:t>Global skalering.</a:t>
+            </a:r>
+          </a:p>
+          <a:p>
+            <a:pPr lvl="1"/>
+            <a:r>
+              <a:rPr lang="nb-NO" dirty="0"/>
+              <a:t>Tilbyr forskjellige </a:t>
             </a:r>
             <a:r>
               <a:rPr lang="nb-NO" dirty="0" err="1"/>
-              <a:t>light</a:t>
-            </a:r>
-            <a:r>
-              <a:rPr lang="nb-NO" dirty="0"/>
-              <a:t>) som tjeneste i skyen</a:t>
-            </a:r>
-          </a:p>
-          <a:p>
-            <a:r>
-              <a:rPr lang="nb-NO" dirty="0"/>
-              <a:t>Cosmos DB</a:t>
-            </a:r>
-          </a:p>
-          <a:p>
-            <a:pPr lvl="1"/>
-            <a:r>
-              <a:rPr lang="nb-NO" dirty="0"/>
-              <a:t>No-SQL-database</a:t>
-            </a:r>
-          </a:p>
-          <a:p>
-            <a:pPr lvl="1"/>
-            <a:r>
-              <a:rPr lang="nb-NO" dirty="0"/>
-              <a:t>API: </a:t>
+              <a:t>APIer</a:t>
+            </a:r>
+            <a:r>
+              <a:rPr lang="nb-NO" dirty="0"/>
+              <a:t>: </a:t>
+            </a:r>
+            <a:r>
+              <a:rPr lang="nb-NO" dirty="0" err="1"/>
+              <a:t>DocumentDB</a:t>
+            </a:r>
+            <a:r>
+              <a:rPr lang="nb-NO" dirty="0"/>
+              <a:t> API </a:t>
             </a:r>
             <a:r>
               <a:rPr lang="nb-NO" dirty="0" err="1"/>
@@ -16239,11 +16314,27 @@
             </a:r>
           </a:p>
           <a:p>
-            <a:pPr lvl="1"/>
-            <a:endParaRPr lang="nb-NO" dirty="0"/>
-          </a:p>
-          <a:p>
-            <a:pPr lvl="1"/>
+            <a:r>
+              <a:rPr lang="nb-NO" dirty="0" err="1"/>
+              <a:t>MySql</a:t>
+            </a:r>
+            <a:r>
+              <a:rPr lang="nb-NO" dirty="0"/>
+              <a:t>, </a:t>
+            </a:r>
+            <a:r>
+              <a:rPr lang="nb-NO" dirty="0" err="1"/>
+              <a:t>PostgreSQL</a:t>
+            </a:r>
+            <a:r>
+              <a:rPr lang="nb-NO" dirty="0"/>
+              <a:t> ++</a:t>
+            </a:r>
+          </a:p>
+          <a:p>
+            <a:pPr marL="357187" lvl="1" indent="0">
+              <a:buNone/>
+            </a:pPr>
             <a:endParaRPr lang="nb-NO" dirty="0"/>
           </a:p>
           <a:p>
@@ -16259,10 +16350,7 @@
               <a:rPr lang="nb-NO" dirty="0" err="1"/>
               <a:t>storage</a:t>
             </a:r>
-            <a:r>
-              <a:rPr lang="nb-NO" dirty="0"/>
-              <a:t>: Velger flere lagringsteknologier i et system for å utnytte </a:t>
-            </a:r>
+            <a:endParaRPr lang="nb-NO" dirty="0"/>
           </a:p>
         </p:txBody>
       </p:sp>
@@ -16406,16 +16494,13 @@
             <a:pPr lvl="1"/>
             <a:r>
               <a:rPr lang="nb-NO" dirty="0"/>
-              <a:t>Ingen generell </a:t>
+              <a:t>Ingen konvensjonell </a:t>
             </a:r>
             <a:r>
               <a:rPr lang="nb-NO" dirty="0" err="1"/>
               <a:t>backup</a:t>
             </a:r>
-            <a:r>
-              <a:rPr lang="nb-NO" dirty="0"/>
-              <a:t> mot f.eks. feilaktig sletting fra bruker</a:t>
-            </a:r>
+            <a:endParaRPr lang="nb-NO" dirty="0"/>
           </a:p>
           <a:p>
             <a:pPr marL="0" indent="0">
@@ -16549,7 +16634,7 @@
             </a:r>
             <a:r>
               <a:rPr lang="nb-NO" dirty="0"/>
-              <a:t> – gir</a:t>
+              <a:t> – gir </a:t>
             </a:r>
           </a:p>
           <a:p>
@@ -16850,7 +16935,7 @@
           <p:cNvPr id="2" name="Content Placeholder 1">
             <a:extLst>
               <a:ext uri="{FF2B5EF4-FFF2-40B4-BE49-F238E27FC236}">
-                <a16:creationId xmlns:a16="http://schemas.microsoft.com/office/drawing/2014/main" id="{C725E11A-D179-4D65-B4B4-C22806C34815}"/>
+                <a16:creationId xmlns:a16="http://schemas.microsoft.com/office/drawing/2014/main" id="{4053DEA3-4405-4C73-BC1B-0B697CA99CD2}"/>
               </a:ext>
             </a:extLst>
           </p:cNvPr>
@@ -16875,7 +16960,7 @@
           <p:cNvPr id="3" name="Title 2">
             <a:extLst>
               <a:ext uri="{FF2B5EF4-FFF2-40B4-BE49-F238E27FC236}">
-                <a16:creationId xmlns:a16="http://schemas.microsoft.com/office/drawing/2014/main" id="{ECCCBE4B-DBBE-4EC1-9CFC-8BFB13D66623}"/>
+                <a16:creationId xmlns:a16="http://schemas.microsoft.com/office/drawing/2014/main" id="{4098D8D6-0722-4559-B467-00605CFF825C}"/>
               </a:ext>
             </a:extLst>
           </p:cNvPr>
@@ -16891,14 +16976,17 @@
           <a:bodyPr/>
           <a:lstStyle/>
           <a:p>
-            <a:endParaRPr lang="nb-NO"/>
+            <a:r>
+              <a:rPr lang="nb-NO" dirty="0"/>
+              <a:t>Demo Azure Storage</a:t>
+            </a:r>
           </a:p>
         </p:txBody>
       </p:sp>
     </p:spTree>
     <p:extLst>
       <p:ext uri="{BB962C8B-B14F-4D97-AF65-F5344CB8AC3E}">
-        <p14:creationId xmlns:p14="http://schemas.microsoft.com/office/powerpoint/2010/main" val="3596042833"/>
+        <p14:creationId xmlns:p14="http://schemas.microsoft.com/office/powerpoint/2010/main" val="4092243870"/>
       </p:ext>
     </p:extLst>
   </p:cSld>
@@ -17205,13 +17293,6 @@
             </a:r>
           </a:p>
           <a:p>
-            <a:pPr lvl="1"/>
-            <a:r>
-              <a:rPr lang="nb-NO" dirty="0"/>
-              <a:t>Ikke nødvendigvis billigere.</a:t>
-            </a:r>
-          </a:p>
-          <a:p>
             <a:r>
               <a:rPr lang="nb-NO" dirty="0"/>
               <a:t>Dynamisk skalering</a:t>
@@ -17401,6 +17482,96 @@
           <a:chExt cx="0" cy="0"/>
         </a:xfrm>
       </p:grpSpPr>
+      <p:pic>
+        <p:nvPicPr>
+          <p:cNvPr id="5" name="Content Placeholder 4">
+            <a:extLst>
+              <a:ext uri="{FF2B5EF4-FFF2-40B4-BE49-F238E27FC236}">
+                <a16:creationId xmlns:a16="http://schemas.microsoft.com/office/drawing/2014/main" id="{3074B7A1-39A4-4082-B89F-2E395E9696C2}"/>
+              </a:ext>
+            </a:extLst>
+          </p:cNvPr>
+          <p:cNvPicPr>
+            <a:picLocks noGrp="1" noChangeAspect="1"/>
+          </p:cNvPicPr>
+          <p:nvPr>
+            <p:ph idx="1"/>
+          </p:nvPr>
+        </p:nvPicPr>
+        <p:blipFill>
+          <a:blip r:embed="rId3">
+            <a:extLst>
+              <a:ext uri="{28A0092B-C50C-407E-A947-70E740481C1C}">
+                <a14:useLocalDpi xmlns:a14="http://schemas.microsoft.com/office/drawing/2010/main" val="0"/>
+              </a:ext>
+            </a:extLst>
+          </a:blip>
+          <a:stretch>
+            <a:fillRect/>
+          </a:stretch>
+        </p:blipFill>
+        <p:spPr>
+          <a:xfrm>
+            <a:off x="1234800" y="1644084"/>
+            <a:ext cx="8741481" cy="4848790"/>
+          </a:xfrm>
+        </p:spPr>
+      </p:pic>
+      <p:sp>
+        <p:nvSpPr>
+          <p:cNvPr id="3" name="Title 2">
+            <a:extLst>
+              <a:ext uri="{FF2B5EF4-FFF2-40B4-BE49-F238E27FC236}">
+                <a16:creationId xmlns:a16="http://schemas.microsoft.com/office/drawing/2014/main" id="{0752D01F-4255-4CCF-9D52-807D973A0D6B}"/>
+              </a:ext>
+            </a:extLst>
+          </p:cNvPr>
+          <p:cNvSpPr>
+            <a:spLocks noGrp="1"/>
+          </p:cNvSpPr>
+          <p:nvPr>
+            <p:ph type="title"/>
+          </p:nvPr>
+        </p:nvSpPr>
+        <p:spPr/>
+        <p:txBody>
+          <a:bodyPr/>
+          <a:lstStyle/>
+          <a:p>
+            <a:endParaRPr lang="nb-NO" dirty="0"/>
+          </a:p>
+        </p:txBody>
+      </p:sp>
+    </p:spTree>
+    <p:extLst>
+      <p:ext uri="{BB962C8B-B14F-4D97-AF65-F5344CB8AC3E}">
+        <p14:creationId xmlns:p14="http://schemas.microsoft.com/office/powerpoint/2010/main" val="3486146099"/>
+      </p:ext>
+    </p:extLst>
+  </p:cSld>
+  <p:clrMapOvr>
+    <a:masterClrMapping/>
+  </p:clrMapOvr>
+</p:sld>
+</file>
+
+<file path=ppt/slides/slide8.xml><?xml version="1.0" encoding="utf-8"?>
+<p:sld xmlns:a="http://schemas.openxmlformats.org/drawingml/2006/main" xmlns:r="http://schemas.openxmlformats.org/officeDocument/2006/relationships" xmlns:p="http://schemas.openxmlformats.org/presentationml/2006/main">
+  <p:cSld>
+    <p:spTree>
+      <p:nvGrpSpPr>
+        <p:cNvPr id="1" name=""/>
+        <p:cNvGrpSpPr/>
+        <p:nvPr/>
+      </p:nvGrpSpPr>
+      <p:grpSpPr>
+        <a:xfrm>
+          <a:off x="0" y="0"/>
+          <a:ext cx="0" cy="0"/>
+          <a:chOff x="0" y="0"/>
+          <a:chExt cx="0" cy="0"/>
+        </a:xfrm>
+      </p:grpSpPr>
       <p:sp>
         <p:nvSpPr>
           <p:cNvPr id="2" name="Content Placeholder 1">
@@ -17448,7 +17619,7 @@
           <a:p>
             <a:r>
               <a:rPr lang="nb-NO" dirty="0"/>
-              <a:t>Måling av latency: </a:t>
+              <a:t>Speedtest: </a:t>
             </a:r>
             <a:r>
               <a:rPr lang="nb-NO" dirty="0">
@@ -17504,7 +17675,7 @@
 </p:sld>
 </file>
 
-<file path=ppt/slides/slide8.xml><?xml version="1.0" encoding="utf-8"?>
+<file path=ppt/slides/slide9.xml><?xml version="1.0" encoding="utf-8"?>
 <p:sld xmlns:a="http://schemas.openxmlformats.org/drawingml/2006/main" xmlns:r="http://schemas.openxmlformats.org/officeDocument/2006/relationships" xmlns:p="http://schemas.openxmlformats.org/presentationml/2006/main">
   <p:cSld>
     <p:spTree>
@@ -17737,96 +17908,6 @@
     <p:extLst>
       <p:ext uri="{BB962C8B-B14F-4D97-AF65-F5344CB8AC3E}">
         <p14:creationId xmlns:p14="http://schemas.microsoft.com/office/powerpoint/2010/main" val="487288096"/>
-      </p:ext>
-    </p:extLst>
-  </p:cSld>
-  <p:clrMapOvr>
-    <a:masterClrMapping/>
-  </p:clrMapOvr>
-</p:sld>
-</file>
-
-<file path=ppt/slides/slide9.xml><?xml version="1.0" encoding="utf-8"?>
-<p:sld xmlns:a="http://schemas.openxmlformats.org/drawingml/2006/main" xmlns:r="http://schemas.openxmlformats.org/officeDocument/2006/relationships" xmlns:p="http://schemas.openxmlformats.org/presentationml/2006/main">
-  <p:cSld>
-    <p:spTree>
-      <p:nvGrpSpPr>
-        <p:cNvPr id="1" name=""/>
-        <p:cNvGrpSpPr/>
-        <p:nvPr/>
-      </p:nvGrpSpPr>
-      <p:grpSpPr>
-        <a:xfrm>
-          <a:off x="0" y="0"/>
-          <a:ext cx="0" cy="0"/>
-          <a:chOff x="0" y="0"/>
-          <a:chExt cx="0" cy="0"/>
-        </a:xfrm>
-      </p:grpSpPr>
-      <p:pic>
-        <p:nvPicPr>
-          <p:cNvPr id="5" name="Content Placeholder 4">
-            <a:extLst>
-              <a:ext uri="{FF2B5EF4-FFF2-40B4-BE49-F238E27FC236}">
-                <a16:creationId xmlns:a16="http://schemas.microsoft.com/office/drawing/2014/main" id="{3074B7A1-39A4-4082-B89F-2E395E9696C2}"/>
-              </a:ext>
-            </a:extLst>
-          </p:cNvPr>
-          <p:cNvPicPr>
-            <a:picLocks noGrp="1" noChangeAspect="1"/>
-          </p:cNvPicPr>
-          <p:nvPr>
-            <p:ph idx="1"/>
-          </p:nvPr>
-        </p:nvPicPr>
-        <p:blipFill>
-          <a:blip r:embed="rId3">
-            <a:extLst>
-              <a:ext uri="{28A0092B-C50C-407E-A947-70E740481C1C}">
-                <a14:useLocalDpi xmlns:a14="http://schemas.microsoft.com/office/drawing/2010/main" val="0"/>
-              </a:ext>
-            </a:extLst>
-          </a:blip>
-          <a:stretch>
-            <a:fillRect/>
-          </a:stretch>
-        </p:blipFill>
-        <p:spPr>
-          <a:xfrm>
-            <a:off x="1234800" y="1644084"/>
-            <a:ext cx="8741481" cy="4848790"/>
-          </a:xfrm>
-        </p:spPr>
-      </p:pic>
-      <p:sp>
-        <p:nvSpPr>
-          <p:cNvPr id="3" name="Title 2">
-            <a:extLst>
-              <a:ext uri="{FF2B5EF4-FFF2-40B4-BE49-F238E27FC236}">
-                <a16:creationId xmlns:a16="http://schemas.microsoft.com/office/drawing/2014/main" id="{0752D01F-4255-4CCF-9D52-807D973A0D6B}"/>
-              </a:ext>
-            </a:extLst>
-          </p:cNvPr>
-          <p:cNvSpPr>
-            <a:spLocks noGrp="1"/>
-          </p:cNvSpPr>
-          <p:nvPr>
-            <p:ph type="title"/>
-          </p:nvPr>
-        </p:nvSpPr>
-        <p:spPr/>
-        <p:txBody>
-          <a:bodyPr/>
-          <a:lstStyle/>
-          <a:p>
-            <a:endParaRPr lang="nb-NO" dirty="0"/>
-          </a:p>
-        </p:txBody>
-      </p:sp>
-    </p:spTree>
-    <p:extLst>
-      <p:ext uri="{BB962C8B-B14F-4D97-AF65-F5344CB8AC3E}">
-        <p14:creationId xmlns:p14="http://schemas.microsoft.com/office/powerpoint/2010/main" val="3486146099"/>
       </p:ext>
     </p:extLst>
   </p:cSld>
@@ -19368,6 +19449,15 @@
 </file>
 
 <file path=customXml/item1.xml><?xml version="1.0" encoding="utf-8"?>
+<?mso-contentType ?>
+<FormTemplates xmlns="http://schemas.microsoft.com/sharepoint/v3/contenttype/forms">
+  <Display>DocumentLibraryForm</Display>
+  <Edit>DocumentLibraryForm</Edit>
+  <New>DocumentLibraryForm</New>
+</FormTemplates>
+</file>
+
+<file path=customXml/item2.xml><?xml version="1.0" encoding="utf-8"?>
 <ct:contentTypeSchema xmlns:ct="http://schemas.microsoft.com/office/2006/metadata/contentType" xmlns:ma="http://schemas.microsoft.com/office/2006/metadata/properties/metaAttributes" ct:_="" ma:_="" ma:contentTypeName="Document" ma:contentTypeID="0x0101005D3CE5A03C88D04F8FE0CC8617320B29" ma:contentTypeVersion="2" ma:contentTypeDescription="Create a new document." ma:contentTypeScope="" ma:versionID="23c508fadb5761cd27fdc7efc393bb78">
   <xsd:schema xmlns:xsd="http://www.w3.org/2001/XMLSchema" xmlns:xs="http://www.w3.org/2001/XMLSchema" xmlns:p="http://schemas.microsoft.com/office/2006/metadata/properties" xmlns:ns2="323bcd62-7d27-4513-9df1-9bc20f03554b" targetNamespace="http://schemas.microsoft.com/office/2006/metadata/properties" ma:root="true" ma:fieldsID="4120a6a9df7c81c23a4d646d2ccf1355" ns2:_="">
     <xsd:import namespace="323bcd62-7d27-4513-9df1-9bc20f03554b"/>
@@ -19499,15 +19589,6 @@
 </ct:contentTypeSchema>
 </file>
 
-<file path=customXml/item2.xml><?xml version="1.0" encoding="utf-8"?>
-<?mso-contentType ?>
-<FormTemplates xmlns="http://schemas.microsoft.com/sharepoint/v3/contenttype/forms">
-  <Display>DocumentLibraryForm</Display>
-  <Edit>DocumentLibraryForm</Edit>
-  <New>DocumentLibraryForm</New>
-</FormTemplates>
-</file>
-
 <file path=customXml/item3.xml><?xml version="1.0" encoding="utf-8"?>
 <p:properties xmlns:p="http://schemas.microsoft.com/office/2006/metadata/properties" xmlns:xsi="http://www.w3.org/2001/XMLSchema-instance" xmlns:pc="http://schemas.microsoft.com/office/infopath/2007/PartnerControls">
   <documentManagement/>
@@ -19515,6 +19596,14 @@
 </file>
 
 <file path=customXml/itemProps1.xml><?xml version="1.0" encoding="utf-8"?>
+<ds:datastoreItem xmlns:ds="http://schemas.openxmlformats.org/officeDocument/2006/customXml" ds:itemID="{BB82CC63-55FC-4D22-9ED3-DB88AF6228E1}">
+  <ds:schemaRefs>
+    <ds:schemaRef ds:uri="http://schemas.microsoft.com/sharepoint/v3/contenttype/forms"/>
+  </ds:schemaRefs>
+</ds:datastoreItem>
+</file>
+
+<file path=customXml/itemProps2.xml><?xml version="1.0" encoding="utf-8"?>
 <ds:datastoreItem xmlns:ds="http://schemas.openxmlformats.org/officeDocument/2006/customXml" ds:itemID="{0377EA4A-9170-43AD-A052-6EABC948F73F}">
   <ds:schemaRefs>
     <ds:schemaRef ds:uri="http://schemas.microsoft.com/office/2006/metadata/contentType"/>
@@ -19528,14 +19617,6 @@
     <ds:schemaRef ds:uri="http://purl.org/dc/elements/1.1/"/>
     <ds:schemaRef ds:uri="http://purl.org/dc/terms/"/>
     <ds:schemaRef ds:uri="http://schemas.microsoft.com/internal/obd"/>
-  </ds:schemaRefs>
-</ds:datastoreItem>
-</file>
-
-<file path=customXml/itemProps2.xml><?xml version="1.0" encoding="utf-8"?>
-<ds:datastoreItem xmlns:ds="http://schemas.openxmlformats.org/officeDocument/2006/customXml" ds:itemID="{BB82CC63-55FC-4D22-9ED3-DB88AF6228E1}">
-  <ds:schemaRefs>
-    <ds:schemaRef ds:uri="http://schemas.microsoft.com/sharepoint/v3/contenttype/forms"/>
   </ds:schemaRefs>
 </ds:datastoreItem>
 </file>

</xml_diff>